<commit_message>
added tuckman's model of team dynamics
added tuckman's model of team dynamics
</commit_message>
<xml_diff>
--- a/PMP/cheat sheet/PMP Cheat Sheet (PMBOK5).pptx
+++ b/PMP/cheat sheet/PMP Cheat Sheet (PMBOK5).pptx
@@ -154,7 +154,7 @@
           </a:lstStyle>
           <a:p>
             <a:r>
-              <a:rPr lang="en-US" smtClean="0"/>
+              <a:rPr lang="en-US"/>
               <a:t>Click to edit Master title style</a:t>
             </a:r>
             <a:endParaRPr lang="en-US" dirty="0"/>
@@ -219,7 +219,7 @@
           </a:lstStyle>
           <a:p>
             <a:r>
-              <a:rPr lang="en-US" smtClean="0"/>
+              <a:rPr lang="en-US"/>
               <a:t>Click to edit Master subtitle style</a:t>
             </a:r>
             <a:endParaRPr lang="en-US" dirty="0"/>
@@ -243,7 +243,7 @@
           <a:p>
             <a:fld id="{07F3E820-8E0F-8F47-85B0-AFF03224420A}" type="datetimeFigureOut">
               <a:rPr lang="en-US" smtClean="0"/>
-              <a:t>10/13/17</a:t>
+              <a:t>10/21/2019</a:t>
             </a:fld>
             <a:endParaRPr lang="en-US"/>
           </a:p>
@@ -285,7 +285,7 @@
           <a:p>
             <a:fld id="{B2CA5237-9B15-4844-9BB7-7682EFDE7FED}" type="slidenum">
               <a:rPr lang="en-US" smtClean="0"/>
-              <a:t>‹#›</a:t>
+              <a:t>‹Nr.›</a:t>
             </a:fld>
             <a:endParaRPr lang="en-US"/>
           </a:p>
@@ -332,7 +332,7 @@
           <a:lstStyle/>
           <a:p>
             <a:r>
-              <a:rPr lang="en-US" smtClean="0"/>
+              <a:rPr lang="en-US"/>
               <a:t>Click to edit Master title style</a:t>
             </a:r>
             <a:endParaRPr lang="en-US" dirty="0"/>
@@ -356,35 +356,35 @@
           <a:p>
             <a:pPr lvl="0"/>
             <a:r>
-              <a:rPr lang="en-US" smtClean="0"/>
+              <a:rPr lang="en-US"/>
               <a:t>Click to edit Master text styles</a:t>
             </a:r>
           </a:p>
           <a:p>
             <a:pPr lvl="1"/>
             <a:r>
-              <a:rPr lang="en-US" smtClean="0"/>
+              <a:rPr lang="en-US"/>
               <a:t>Second level</a:t>
             </a:r>
           </a:p>
           <a:p>
             <a:pPr lvl="2"/>
             <a:r>
-              <a:rPr lang="en-US" smtClean="0"/>
+              <a:rPr lang="en-US"/>
               <a:t>Third level</a:t>
             </a:r>
           </a:p>
           <a:p>
             <a:pPr lvl="3"/>
             <a:r>
-              <a:rPr lang="en-US" smtClean="0"/>
+              <a:rPr lang="en-US"/>
               <a:t>Fourth level</a:t>
             </a:r>
           </a:p>
           <a:p>
             <a:pPr lvl="4"/>
             <a:r>
-              <a:rPr lang="en-US" smtClean="0"/>
+              <a:rPr lang="en-US"/>
               <a:t>Fifth level</a:t>
             </a:r>
             <a:endParaRPr lang="en-US" dirty="0"/>
@@ -408,7 +408,7 @@
           <a:p>
             <a:fld id="{07F3E820-8E0F-8F47-85B0-AFF03224420A}" type="datetimeFigureOut">
               <a:rPr lang="en-US" smtClean="0"/>
-              <a:t>10/13/17</a:t>
+              <a:t>10/21/2019</a:t>
             </a:fld>
             <a:endParaRPr lang="en-US"/>
           </a:p>
@@ -450,7 +450,7 @@
           <a:p>
             <a:fld id="{B2CA5237-9B15-4844-9BB7-7682EFDE7FED}" type="slidenum">
               <a:rPr lang="en-US" smtClean="0"/>
-              <a:t>‹#›</a:t>
+              <a:t>‹Nr.›</a:t>
             </a:fld>
             <a:endParaRPr lang="en-US"/>
           </a:p>
@@ -502,7 +502,7 @@
           <a:lstStyle/>
           <a:p>
             <a:r>
-              <a:rPr lang="en-US" smtClean="0"/>
+              <a:rPr lang="en-US"/>
               <a:t>Click to edit Master title style</a:t>
             </a:r>
             <a:endParaRPr lang="en-US" dirty="0"/>
@@ -531,35 +531,35 @@
           <a:p>
             <a:pPr lvl="0"/>
             <a:r>
-              <a:rPr lang="en-US" smtClean="0"/>
+              <a:rPr lang="en-US"/>
               <a:t>Click to edit Master text styles</a:t>
             </a:r>
           </a:p>
           <a:p>
             <a:pPr lvl="1"/>
             <a:r>
-              <a:rPr lang="en-US" smtClean="0"/>
+              <a:rPr lang="en-US"/>
               <a:t>Second level</a:t>
             </a:r>
           </a:p>
           <a:p>
             <a:pPr lvl="2"/>
             <a:r>
-              <a:rPr lang="en-US" smtClean="0"/>
+              <a:rPr lang="en-US"/>
               <a:t>Third level</a:t>
             </a:r>
           </a:p>
           <a:p>
             <a:pPr lvl="3"/>
             <a:r>
-              <a:rPr lang="en-US" smtClean="0"/>
+              <a:rPr lang="en-US"/>
               <a:t>Fourth level</a:t>
             </a:r>
           </a:p>
           <a:p>
             <a:pPr lvl="4"/>
             <a:r>
-              <a:rPr lang="en-US" smtClean="0"/>
+              <a:rPr lang="en-US"/>
               <a:t>Fifth level</a:t>
             </a:r>
             <a:endParaRPr lang="en-US" dirty="0"/>
@@ -583,7 +583,7 @@
           <a:p>
             <a:fld id="{07F3E820-8E0F-8F47-85B0-AFF03224420A}" type="datetimeFigureOut">
               <a:rPr lang="en-US" smtClean="0"/>
-              <a:t>10/13/17</a:t>
+              <a:t>10/21/2019</a:t>
             </a:fld>
             <a:endParaRPr lang="en-US"/>
           </a:p>
@@ -625,7 +625,7 @@
           <a:p>
             <a:fld id="{B2CA5237-9B15-4844-9BB7-7682EFDE7FED}" type="slidenum">
               <a:rPr lang="en-US" smtClean="0"/>
-              <a:t>‹#›</a:t>
+              <a:t>‹Nr.›</a:t>
             </a:fld>
             <a:endParaRPr lang="en-US"/>
           </a:p>
@@ -672,7 +672,7 @@
           <a:lstStyle/>
           <a:p>
             <a:r>
-              <a:rPr lang="en-US" smtClean="0"/>
+              <a:rPr lang="en-US"/>
               <a:t>Click to edit Master title style</a:t>
             </a:r>
             <a:endParaRPr lang="en-US" dirty="0"/>
@@ -696,35 +696,35 @@
           <a:p>
             <a:pPr lvl="0"/>
             <a:r>
-              <a:rPr lang="en-US" smtClean="0"/>
+              <a:rPr lang="en-US"/>
               <a:t>Click to edit Master text styles</a:t>
             </a:r>
           </a:p>
           <a:p>
             <a:pPr lvl="1"/>
             <a:r>
-              <a:rPr lang="en-US" smtClean="0"/>
+              <a:rPr lang="en-US"/>
               <a:t>Second level</a:t>
             </a:r>
           </a:p>
           <a:p>
             <a:pPr lvl="2"/>
             <a:r>
-              <a:rPr lang="en-US" smtClean="0"/>
+              <a:rPr lang="en-US"/>
               <a:t>Third level</a:t>
             </a:r>
           </a:p>
           <a:p>
             <a:pPr lvl="3"/>
             <a:r>
-              <a:rPr lang="en-US" smtClean="0"/>
+              <a:rPr lang="en-US"/>
               <a:t>Fourth level</a:t>
             </a:r>
           </a:p>
           <a:p>
             <a:pPr lvl="4"/>
             <a:r>
-              <a:rPr lang="en-US" smtClean="0"/>
+              <a:rPr lang="en-US"/>
               <a:t>Fifth level</a:t>
             </a:r>
             <a:endParaRPr lang="en-US" dirty="0"/>
@@ -748,7 +748,7 @@
           <a:p>
             <a:fld id="{07F3E820-8E0F-8F47-85B0-AFF03224420A}" type="datetimeFigureOut">
               <a:rPr lang="en-US" smtClean="0"/>
-              <a:t>10/13/17</a:t>
+              <a:t>10/21/2019</a:t>
             </a:fld>
             <a:endParaRPr lang="en-US"/>
           </a:p>
@@ -790,7 +790,7 @@
           <a:p>
             <a:fld id="{B2CA5237-9B15-4844-9BB7-7682EFDE7FED}" type="slidenum">
               <a:rPr lang="en-US" smtClean="0"/>
-              <a:t>‹#›</a:t>
+              <a:t>‹Nr.›</a:t>
             </a:fld>
             <a:endParaRPr lang="en-US"/>
           </a:p>
@@ -846,7 +846,7 @@
           </a:lstStyle>
           <a:p>
             <a:r>
-              <a:rPr lang="en-US" smtClean="0"/>
+              <a:rPr lang="en-US"/>
               <a:t>Click to edit Master title style</a:t>
             </a:r>
             <a:endParaRPr lang="en-US" dirty="0"/>
@@ -964,7 +964,7 @@
           <a:p>
             <a:pPr lvl="0"/>
             <a:r>
-              <a:rPr lang="en-US" smtClean="0"/>
+              <a:rPr lang="en-US"/>
               <a:t>Click to edit Master text styles</a:t>
             </a:r>
           </a:p>
@@ -987,7 +987,7 @@
           <a:p>
             <a:fld id="{07F3E820-8E0F-8F47-85B0-AFF03224420A}" type="datetimeFigureOut">
               <a:rPr lang="en-US" smtClean="0"/>
-              <a:t>10/13/17</a:t>
+              <a:t>10/21/2019</a:t>
             </a:fld>
             <a:endParaRPr lang="en-US"/>
           </a:p>
@@ -1029,7 +1029,7 @@
           <a:p>
             <a:fld id="{B2CA5237-9B15-4844-9BB7-7682EFDE7FED}" type="slidenum">
               <a:rPr lang="en-US" smtClean="0"/>
-              <a:t>‹#›</a:t>
+              <a:t>‹Nr.›</a:t>
             </a:fld>
             <a:endParaRPr lang="en-US"/>
           </a:p>
@@ -1076,7 +1076,7 @@
           <a:lstStyle/>
           <a:p>
             <a:r>
-              <a:rPr lang="en-US" smtClean="0"/>
+              <a:rPr lang="en-US"/>
               <a:t>Click to edit Master title style</a:t>
             </a:r>
             <a:endParaRPr lang="en-US" dirty="0"/>
@@ -1105,35 +1105,35 @@
           <a:p>
             <a:pPr lvl="0"/>
             <a:r>
-              <a:rPr lang="en-US" smtClean="0"/>
+              <a:rPr lang="en-US"/>
               <a:t>Click to edit Master text styles</a:t>
             </a:r>
           </a:p>
           <a:p>
             <a:pPr lvl="1"/>
             <a:r>
-              <a:rPr lang="en-US" smtClean="0"/>
+              <a:rPr lang="en-US"/>
               <a:t>Second level</a:t>
             </a:r>
           </a:p>
           <a:p>
             <a:pPr lvl="2"/>
             <a:r>
-              <a:rPr lang="en-US" smtClean="0"/>
+              <a:rPr lang="en-US"/>
               <a:t>Third level</a:t>
             </a:r>
           </a:p>
           <a:p>
             <a:pPr lvl="3"/>
             <a:r>
-              <a:rPr lang="en-US" smtClean="0"/>
+              <a:rPr lang="en-US"/>
               <a:t>Fourth level</a:t>
             </a:r>
           </a:p>
           <a:p>
             <a:pPr lvl="4"/>
             <a:r>
-              <a:rPr lang="en-US" smtClean="0"/>
+              <a:rPr lang="en-US"/>
               <a:t>Fifth level</a:t>
             </a:r>
             <a:endParaRPr lang="en-US" dirty="0"/>
@@ -1162,35 +1162,35 @@
           <a:p>
             <a:pPr lvl="0"/>
             <a:r>
-              <a:rPr lang="en-US" smtClean="0"/>
+              <a:rPr lang="en-US"/>
               <a:t>Click to edit Master text styles</a:t>
             </a:r>
           </a:p>
           <a:p>
             <a:pPr lvl="1"/>
             <a:r>
-              <a:rPr lang="en-US" smtClean="0"/>
+              <a:rPr lang="en-US"/>
               <a:t>Second level</a:t>
             </a:r>
           </a:p>
           <a:p>
             <a:pPr lvl="2"/>
             <a:r>
-              <a:rPr lang="en-US" smtClean="0"/>
+              <a:rPr lang="en-US"/>
               <a:t>Third level</a:t>
             </a:r>
           </a:p>
           <a:p>
             <a:pPr lvl="3"/>
             <a:r>
-              <a:rPr lang="en-US" smtClean="0"/>
+              <a:rPr lang="en-US"/>
               <a:t>Fourth level</a:t>
             </a:r>
           </a:p>
           <a:p>
             <a:pPr lvl="4"/>
             <a:r>
-              <a:rPr lang="en-US" smtClean="0"/>
+              <a:rPr lang="en-US"/>
               <a:t>Fifth level</a:t>
             </a:r>
             <a:endParaRPr lang="en-US" dirty="0"/>
@@ -1214,7 +1214,7 @@
           <a:p>
             <a:fld id="{07F3E820-8E0F-8F47-85B0-AFF03224420A}" type="datetimeFigureOut">
               <a:rPr lang="en-US" smtClean="0"/>
-              <a:t>10/13/17</a:t>
+              <a:t>10/21/2019</a:t>
             </a:fld>
             <a:endParaRPr lang="en-US"/>
           </a:p>
@@ -1256,7 +1256,7 @@
           <a:p>
             <a:fld id="{B2CA5237-9B15-4844-9BB7-7682EFDE7FED}" type="slidenum">
               <a:rPr lang="en-US" smtClean="0"/>
-              <a:t>‹#›</a:t>
+              <a:t>‹Nr.›</a:t>
             </a:fld>
             <a:endParaRPr lang="en-US"/>
           </a:p>
@@ -1308,7 +1308,7 @@
           <a:lstStyle/>
           <a:p>
             <a:r>
-              <a:rPr lang="en-US" smtClean="0"/>
+              <a:rPr lang="en-US"/>
               <a:t>Click to edit Master title style</a:t>
             </a:r>
             <a:endParaRPr lang="en-US" dirty="0"/>
@@ -1374,7 +1374,7 @@
           <a:p>
             <a:pPr lvl="0"/>
             <a:r>
-              <a:rPr lang="en-US" smtClean="0"/>
+              <a:rPr lang="en-US"/>
               <a:t>Click to edit Master text styles</a:t>
             </a:r>
           </a:p>
@@ -1402,35 +1402,35 @@
           <a:p>
             <a:pPr lvl="0"/>
             <a:r>
-              <a:rPr lang="en-US" smtClean="0"/>
+              <a:rPr lang="en-US"/>
               <a:t>Click to edit Master text styles</a:t>
             </a:r>
           </a:p>
           <a:p>
             <a:pPr lvl="1"/>
             <a:r>
-              <a:rPr lang="en-US" smtClean="0"/>
+              <a:rPr lang="en-US"/>
               <a:t>Second level</a:t>
             </a:r>
           </a:p>
           <a:p>
             <a:pPr lvl="2"/>
             <a:r>
-              <a:rPr lang="en-US" smtClean="0"/>
+              <a:rPr lang="en-US"/>
               <a:t>Third level</a:t>
             </a:r>
           </a:p>
           <a:p>
             <a:pPr lvl="3"/>
             <a:r>
-              <a:rPr lang="en-US" smtClean="0"/>
+              <a:rPr lang="en-US"/>
               <a:t>Fourth level</a:t>
             </a:r>
           </a:p>
           <a:p>
             <a:pPr lvl="4"/>
             <a:r>
-              <a:rPr lang="en-US" smtClean="0"/>
+              <a:rPr lang="en-US"/>
               <a:t>Fifth level</a:t>
             </a:r>
             <a:endParaRPr lang="en-US" dirty="0"/>
@@ -1496,7 +1496,7 @@
           <a:p>
             <a:pPr lvl="0"/>
             <a:r>
-              <a:rPr lang="en-US" smtClean="0"/>
+              <a:rPr lang="en-US"/>
               <a:t>Click to edit Master text styles</a:t>
             </a:r>
           </a:p>
@@ -1524,35 +1524,35 @@
           <a:p>
             <a:pPr lvl="0"/>
             <a:r>
-              <a:rPr lang="en-US" smtClean="0"/>
+              <a:rPr lang="en-US"/>
               <a:t>Click to edit Master text styles</a:t>
             </a:r>
           </a:p>
           <a:p>
             <a:pPr lvl="1"/>
             <a:r>
-              <a:rPr lang="en-US" smtClean="0"/>
+              <a:rPr lang="en-US"/>
               <a:t>Second level</a:t>
             </a:r>
           </a:p>
           <a:p>
             <a:pPr lvl="2"/>
             <a:r>
-              <a:rPr lang="en-US" smtClean="0"/>
+              <a:rPr lang="en-US"/>
               <a:t>Third level</a:t>
             </a:r>
           </a:p>
           <a:p>
             <a:pPr lvl="3"/>
             <a:r>
-              <a:rPr lang="en-US" smtClean="0"/>
+              <a:rPr lang="en-US"/>
               <a:t>Fourth level</a:t>
             </a:r>
           </a:p>
           <a:p>
             <a:pPr lvl="4"/>
             <a:r>
-              <a:rPr lang="en-US" smtClean="0"/>
+              <a:rPr lang="en-US"/>
               <a:t>Fifth level</a:t>
             </a:r>
             <a:endParaRPr lang="en-US" dirty="0"/>
@@ -1576,7 +1576,7 @@
           <a:p>
             <a:fld id="{07F3E820-8E0F-8F47-85B0-AFF03224420A}" type="datetimeFigureOut">
               <a:rPr lang="en-US" smtClean="0"/>
-              <a:t>10/13/17</a:t>
+              <a:t>10/21/2019</a:t>
             </a:fld>
             <a:endParaRPr lang="en-US"/>
           </a:p>
@@ -1618,7 +1618,7 @@
           <a:p>
             <a:fld id="{B2CA5237-9B15-4844-9BB7-7682EFDE7FED}" type="slidenum">
               <a:rPr lang="en-US" smtClean="0"/>
-              <a:t>‹#›</a:t>
+              <a:t>‹Nr.›</a:t>
             </a:fld>
             <a:endParaRPr lang="en-US"/>
           </a:p>
@@ -1665,7 +1665,7 @@
           <a:lstStyle/>
           <a:p>
             <a:r>
-              <a:rPr lang="en-US" smtClean="0"/>
+              <a:rPr lang="en-US"/>
               <a:t>Click to edit Master title style</a:t>
             </a:r>
             <a:endParaRPr lang="en-US" dirty="0"/>
@@ -1689,7 +1689,7 @@
           <a:p>
             <a:fld id="{07F3E820-8E0F-8F47-85B0-AFF03224420A}" type="datetimeFigureOut">
               <a:rPr lang="en-US" smtClean="0"/>
-              <a:t>10/13/17</a:t>
+              <a:t>10/21/2019</a:t>
             </a:fld>
             <a:endParaRPr lang="en-US"/>
           </a:p>
@@ -1731,7 +1731,7 @@
           <a:p>
             <a:fld id="{B2CA5237-9B15-4844-9BB7-7682EFDE7FED}" type="slidenum">
               <a:rPr lang="en-US" smtClean="0"/>
-              <a:t>‹#›</a:t>
+              <a:t>‹Nr.›</a:t>
             </a:fld>
             <a:endParaRPr lang="en-US"/>
           </a:p>
@@ -1779,7 +1779,7 @@
           <a:p>
             <a:fld id="{07F3E820-8E0F-8F47-85B0-AFF03224420A}" type="datetimeFigureOut">
               <a:rPr lang="en-US" smtClean="0"/>
-              <a:t>10/13/17</a:t>
+              <a:t>10/21/2019</a:t>
             </a:fld>
             <a:endParaRPr lang="en-US"/>
           </a:p>
@@ -1821,7 +1821,7 @@
           <a:p>
             <a:fld id="{B2CA5237-9B15-4844-9BB7-7682EFDE7FED}" type="slidenum">
               <a:rPr lang="en-US" smtClean="0"/>
-              <a:t>‹#›</a:t>
+              <a:t>‹Nr.›</a:t>
             </a:fld>
             <a:endParaRPr lang="en-US"/>
           </a:p>
@@ -1877,7 +1877,7 @@
           </a:lstStyle>
           <a:p>
             <a:r>
-              <a:rPr lang="en-US" smtClean="0"/>
+              <a:rPr lang="en-US"/>
               <a:t>Click to edit Master title style</a:t>
             </a:r>
             <a:endParaRPr lang="en-US" dirty="0"/>
@@ -1934,35 +1934,35 @@
           <a:p>
             <a:pPr lvl="0"/>
             <a:r>
-              <a:rPr lang="en-US" smtClean="0"/>
+              <a:rPr lang="en-US"/>
               <a:t>Click to edit Master text styles</a:t>
             </a:r>
           </a:p>
           <a:p>
             <a:pPr lvl="1"/>
             <a:r>
-              <a:rPr lang="en-US" smtClean="0"/>
+              <a:rPr lang="en-US"/>
               <a:t>Second level</a:t>
             </a:r>
           </a:p>
           <a:p>
             <a:pPr lvl="2"/>
             <a:r>
-              <a:rPr lang="en-US" smtClean="0"/>
+              <a:rPr lang="en-US"/>
               <a:t>Third level</a:t>
             </a:r>
           </a:p>
           <a:p>
             <a:pPr lvl="3"/>
             <a:r>
-              <a:rPr lang="en-US" smtClean="0"/>
+              <a:rPr lang="en-US"/>
               <a:t>Fourth level</a:t>
             </a:r>
           </a:p>
           <a:p>
             <a:pPr lvl="4"/>
             <a:r>
-              <a:rPr lang="en-US" smtClean="0"/>
+              <a:rPr lang="en-US"/>
               <a:t>Fifth level</a:t>
             </a:r>
             <a:endParaRPr lang="en-US" dirty="0"/>
@@ -2028,7 +2028,7 @@
           <a:p>
             <a:pPr lvl="0"/>
             <a:r>
-              <a:rPr lang="en-US" smtClean="0"/>
+              <a:rPr lang="en-US"/>
               <a:t>Click to edit Master text styles</a:t>
             </a:r>
           </a:p>
@@ -2051,7 +2051,7 @@
           <a:p>
             <a:fld id="{07F3E820-8E0F-8F47-85B0-AFF03224420A}" type="datetimeFigureOut">
               <a:rPr lang="en-US" smtClean="0"/>
-              <a:t>10/13/17</a:t>
+              <a:t>10/21/2019</a:t>
             </a:fld>
             <a:endParaRPr lang="en-US"/>
           </a:p>
@@ -2093,7 +2093,7 @@
           <a:p>
             <a:fld id="{B2CA5237-9B15-4844-9BB7-7682EFDE7FED}" type="slidenum">
               <a:rPr lang="en-US" smtClean="0"/>
-              <a:t>‹#›</a:t>
+              <a:t>‹Nr.›</a:t>
             </a:fld>
             <a:endParaRPr lang="en-US"/>
           </a:p>
@@ -2149,7 +2149,7 @@
           </a:lstStyle>
           <a:p>
             <a:r>
-              <a:rPr lang="en-US" smtClean="0"/>
+              <a:rPr lang="en-US"/>
               <a:t>Click to edit Master title style</a:t>
             </a:r>
             <a:endParaRPr lang="en-US" dirty="0"/>
@@ -2214,7 +2214,7 @@
           </a:lstStyle>
           <a:p>
             <a:r>
-              <a:rPr lang="en-US" smtClean="0"/>
+              <a:rPr lang="en-US"/>
               <a:t>Drag picture to placeholder or click icon to add</a:t>
             </a:r>
             <a:endParaRPr lang="en-US" dirty="0"/>
@@ -2280,7 +2280,7 @@
           <a:p>
             <a:pPr lvl="0"/>
             <a:r>
-              <a:rPr lang="en-US" smtClean="0"/>
+              <a:rPr lang="en-US"/>
               <a:t>Click to edit Master text styles</a:t>
             </a:r>
           </a:p>
@@ -2303,7 +2303,7 @@
           <a:p>
             <a:fld id="{07F3E820-8E0F-8F47-85B0-AFF03224420A}" type="datetimeFigureOut">
               <a:rPr lang="en-US" smtClean="0"/>
-              <a:t>10/13/17</a:t>
+              <a:t>10/21/2019</a:t>
             </a:fld>
             <a:endParaRPr lang="en-US"/>
           </a:p>
@@ -2345,7 +2345,7 @@
           <a:p>
             <a:fld id="{B2CA5237-9B15-4844-9BB7-7682EFDE7FED}" type="slidenum">
               <a:rPr lang="en-US" smtClean="0"/>
-              <a:t>‹#›</a:t>
+              <a:t>‹Nr.›</a:t>
             </a:fld>
             <a:endParaRPr lang="en-US"/>
           </a:p>
@@ -2407,7 +2407,7 @@
           <a:lstStyle/>
           <a:p>
             <a:r>
-              <a:rPr lang="en-US" smtClean="0"/>
+              <a:rPr lang="en-US"/>
               <a:t>Click to edit Master title style</a:t>
             </a:r>
             <a:endParaRPr lang="en-US" dirty="0"/>
@@ -2441,35 +2441,35 @@
           <a:p>
             <a:pPr lvl="0"/>
             <a:r>
-              <a:rPr lang="en-US" smtClean="0"/>
+              <a:rPr lang="en-US"/>
               <a:t>Click to edit Master text styles</a:t>
             </a:r>
           </a:p>
           <a:p>
             <a:pPr lvl="1"/>
             <a:r>
-              <a:rPr lang="en-US" smtClean="0"/>
+              <a:rPr lang="en-US"/>
               <a:t>Second level</a:t>
             </a:r>
           </a:p>
           <a:p>
             <a:pPr lvl="2"/>
             <a:r>
-              <a:rPr lang="en-US" smtClean="0"/>
+              <a:rPr lang="en-US"/>
               <a:t>Third level</a:t>
             </a:r>
           </a:p>
           <a:p>
             <a:pPr lvl="3"/>
             <a:r>
-              <a:rPr lang="en-US" smtClean="0"/>
+              <a:rPr lang="en-US"/>
               <a:t>Fourth level</a:t>
             </a:r>
           </a:p>
           <a:p>
             <a:pPr lvl="4"/>
             <a:r>
-              <a:rPr lang="en-US" smtClean="0"/>
+              <a:rPr lang="en-US"/>
               <a:t>Fifth level</a:t>
             </a:r>
             <a:endParaRPr lang="en-US" dirty="0"/>
@@ -2511,7 +2511,7 @@
           <a:p>
             <a:fld id="{07F3E820-8E0F-8F47-85B0-AFF03224420A}" type="datetimeFigureOut">
               <a:rPr lang="en-US" smtClean="0"/>
-              <a:t>10/13/17</a:t>
+              <a:t>10/21/2019</a:t>
             </a:fld>
             <a:endParaRPr lang="en-US"/>
           </a:p>
@@ -2589,7 +2589,7 @@
           <a:p>
             <a:fld id="{B2CA5237-9B15-4844-9BB7-7682EFDE7FED}" type="slidenum">
               <a:rPr lang="en-US" smtClean="0"/>
-              <a:t>‹#›</a:t>
+              <a:t>‹Nr.›</a:t>
             </a:fld>
             <a:endParaRPr lang="en-US"/>
           </a:p>
@@ -2951,7 +2951,7 @@
               </a:spcAft>
             </a:pPr>
             <a:r>
-              <a:rPr lang="en-US" sz="860" b="1" dirty="0" smtClean="0">
+              <a:rPr lang="en-US" sz="860" b="1" dirty="0">
                 <a:latin typeface="Calibri" charset="0"/>
                 <a:ea typeface="Calibri" charset="0"/>
                 <a:cs typeface="Calibri" charset="0"/>
@@ -2961,7 +2961,7 @@
           </a:p>
           <a:p>
             <a:r>
-              <a:rPr lang="en-US" sz="860" dirty="0" smtClean="0">
+              <a:rPr lang="en-US" sz="860" dirty="0">
                 <a:latin typeface="Calibri" charset="0"/>
                 <a:ea typeface="Calibri" charset="0"/>
                 <a:cs typeface="Calibri" charset="0"/>
@@ -2971,7 +2971,7 @@
           </a:p>
           <a:p>
             <a:r>
-              <a:rPr lang="en-US" sz="860" dirty="0" smtClean="0">
+              <a:rPr lang="en-US" sz="860" dirty="0">
                 <a:latin typeface="Calibri" charset="0"/>
                 <a:ea typeface="Calibri" charset="0"/>
                 <a:cs typeface="Calibri" charset="0"/>
@@ -2989,20 +2989,12 @@
               </a:spcAft>
             </a:pPr>
             <a:r>
-              <a:rPr lang="en-US" sz="860" b="1" dirty="0" smtClean="0">
-                <a:latin typeface="Calibri" charset="0"/>
-                <a:ea typeface="Calibri" charset="0"/>
-                <a:cs typeface="Calibri" charset="0"/>
-              </a:rPr>
-              <a:t>Integration </a:t>
-            </a:r>
-            <a:r>
               <a:rPr lang="en-US" sz="860" b="1" dirty="0">
                 <a:latin typeface="Calibri" charset="0"/>
                 <a:ea typeface="Calibri" charset="0"/>
                 <a:cs typeface="Calibri" charset="0"/>
               </a:rPr>
-              <a:t>Management</a:t>
+              <a:t>Integration Management</a:t>
             </a:r>
           </a:p>
           <a:p>
@@ -3877,82 +3869,82 @@
           <a:lstStyle/>
           <a:p>
             <a:r>
-              <a:rPr lang="en-US" sz="900" dirty="0" smtClean="0"/>
+              <a:rPr lang="en-US" sz="900" dirty="0"/>
               <a:t>CV = EV – AC</a:t>
             </a:r>
           </a:p>
           <a:p>
             <a:r>
-              <a:rPr lang="en-US" sz="900" dirty="0" smtClean="0"/>
+              <a:rPr lang="en-US" sz="900" dirty="0"/>
               <a:t>SV = EV – PV</a:t>
             </a:r>
           </a:p>
           <a:p>
             <a:r>
-              <a:rPr lang="en-US" sz="900" dirty="0" smtClean="0"/>
+              <a:rPr lang="en-US" sz="900" dirty="0"/>
               <a:t>CPI = EV / AC</a:t>
             </a:r>
           </a:p>
           <a:p>
             <a:r>
-              <a:rPr lang="en-US" sz="900" dirty="0" smtClean="0"/>
+              <a:rPr lang="en-US" sz="900" dirty="0"/>
               <a:t>SPI = EV / PV</a:t>
             </a:r>
           </a:p>
           <a:p>
             <a:r>
-              <a:rPr lang="en-US" sz="900" dirty="0" smtClean="0"/>
+              <a:rPr lang="en-US" sz="900" dirty="0"/>
               <a:t>Burning Rate = AC / EV</a:t>
             </a:r>
           </a:p>
           <a:p>
             <a:r>
-              <a:rPr lang="en-US" sz="900" dirty="0" smtClean="0"/>
+              <a:rPr lang="en-US" sz="900" dirty="0"/>
               <a:t>EAC = BAC / CPI</a:t>
             </a:r>
           </a:p>
           <a:p>
             <a:r>
-              <a:rPr lang="en-US" sz="900" dirty="0" smtClean="0"/>
+              <a:rPr lang="en-US" sz="900" dirty="0"/>
               <a:t>ETC = EAC – AC</a:t>
             </a:r>
           </a:p>
           <a:p>
             <a:r>
-              <a:rPr lang="en-US" sz="900" dirty="0" smtClean="0"/>
+              <a:rPr lang="en-US" sz="900" dirty="0"/>
               <a:t>TCPI = (BAC–EV) / (BAC–AC)</a:t>
             </a:r>
           </a:p>
           <a:p>
             <a:r>
-              <a:rPr lang="en-US" sz="900" dirty="0" smtClean="0"/>
+              <a:rPr lang="en-US" sz="900" dirty="0"/>
               <a:t>TCPI = </a:t>
             </a:r>
             <a:r>
-              <a:rPr lang="en-US" sz="900" dirty="0" err="1" smtClean="0"/>
+              <a:rPr lang="en-US" sz="900" dirty="0" err="1"/>
               <a:t>Work</a:t>
             </a:r>
             <a:r>
-              <a:rPr lang="en-US" sz="900" baseline="-25000" dirty="0" err="1" smtClean="0"/>
+              <a:rPr lang="en-US" sz="900" baseline="-25000" dirty="0" err="1"/>
               <a:t>Rest</a:t>
             </a:r>
             <a:r>
-              <a:rPr lang="en-US" sz="900" dirty="0" smtClean="0"/>
+              <a:rPr lang="en-US" sz="900" dirty="0"/>
               <a:t> / </a:t>
             </a:r>
             <a:r>
-              <a:rPr lang="en-US" sz="900" dirty="0" err="1" smtClean="0"/>
+              <a:rPr lang="en-US" sz="900" dirty="0" err="1"/>
               <a:t>Cost</a:t>
             </a:r>
             <a:r>
-              <a:rPr lang="en-US" sz="900" baseline="-25000" dirty="0" err="1" smtClean="0"/>
+              <a:rPr lang="en-US" sz="900" baseline="-25000" dirty="0" err="1"/>
               <a:t>Rest</a:t>
             </a:r>
-            <a:endParaRPr lang="en-US" sz="900" baseline="-25000" dirty="0" smtClean="0"/>
-          </a:p>
-          <a:p>
-            <a:r>
-              <a:rPr lang="en-US" sz="900" dirty="0" smtClean="0"/>
+            <a:endParaRPr lang="en-US" sz="900" baseline="-25000" dirty="0"/>
+          </a:p>
+          <a:p>
+            <a:r>
+              <a:rPr lang="en-US" sz="900" dirty="0"/>
               <a:t>VAC = BAC – EAC</a:t>
             </a:r>
           </a:p>
@@ -3985,12 +3977,8 @@
           <a:lstStyle/>
           <a:p>
             <a:r>
-              <a:rPr lang="en-US" sz="900" dirty="0" smtClean="0"/>
-              <a:t># of Channels </a:t>
-            </a:r>
-            <a:r>
               <a:rPr lang="en-US" sz="900" dirty="0"/>
-              <a:t>= N (N – 1) / 2</a:t>
+              <a:t># of Channels = N (N – 1) / 2</a:t>
             </a:r>
           </a:p>
           <a:p>
@@ -4084,25 +4072,167 @@
           <a:p>
             <a:r>
               <a:rPr lang="en-US" sz="900" dirty="0"/>
-              <a:t>3𝜎=99.7%     6𝜎=99.99</a:t>
-            </a:r>
-            <a:r>
-              <a:rPr lang="en-US" sz="900" dirty="0" smtClean="0"/>
-              <a:t>%</a:t>
-            </a:r>
-            <a:endParaRPr lang="en-US" sz="900" dirty="0"/>
+              <a:t>3𝜎=99.7%     6𝜎=99.99%</a:t>
+            </a:r>
+          </a:p>
+        </p:txBody>
+      </p:sp>
+      <p:sp>
+        <p:nvSpPr>
+          <p:cNvPr id="2" name="TextBox 1"/>
+          <p:cNvSpPr txBox="1"/>
+          <p:nvPr/>
+        </p:nvSpPr>
+        <p:spPr>
+          <a:xfrm>
+            <a:off x="0" y="9536668"/>
+            <a:ext cx="6858000" cy="246221"/>
+          </a:xfrm>
+          <a:prstGeom prst="rect">
+            <a:avLst/>
+          </a:prstGeom>
+          <a:noFill/>
+        </p:spPr>
+        <p:txBody>
+          <a:bodyPr wrap="square" rtlCol="0">
+            <a:spAutoFit/>
+          </a:bodyPr>
+          <a:lstStyle/>
+          <a:p>
+            <a:pPr algn="ctr"/>
+            <a:r>
+              <a:rPr lang="en-US" sz="1000" dirty="0"/>
+              <a:t>©</a:t>
+            </a:r>
+            <a:r>
+              <a:rPr lang="en-US" sz="1000" dirty="0" err="1"/>
+              <a:t>Jörg</a:t>
+            </a:r>
+            <a:r>
+              <a:rPr lang="en-US" sz="1000" dirty="0"/>
+              <a:t> </a:t>
+            </a:r>
+            <a:r>
+              <a:rPr lang="en-US" sz="1000" dirty="0" err="1"/>
+              <a:t>Kuharev</a:t>
+            </a:r>
+            <a:r>
+              <a:rPr lang="en-US" sz="1000" dirty="0"/>
+              <a:t>, 2017, based on PMBOK 5</a:t>
+            </a:r>
+            <a:r>
+              <a:rPr lang="en-US" sz="1000" baseline="30000" dirty="0"/>
+              <a:t>th</a:t>
+            </a:r>
+            <a:r>
+              <a:rPr lang="en-US" sz="1000" dirty="0"/>
+              <a:t> Edition</a:t>
+            </a:r>
+          </a:p>
+        </p:txBody>
+      </p:sp>
+      <p:sp>
+        <p:nvSpPr>
+          <p:cNvPr id="13" name="Rectangle 15"/>
+          <p:cNvSpPr/>
+          <p:nvPr/>
+        </p:nvSpPr>
+        <p:spPr>
+          <a:xfrm>
+            <a:off x="5066675" y="7708357"/>
+            <a:ext cx="1615088" cy="369332"/>
+          </a:xfrm>
+          <a:prstGeom prst="rect">
+            <a:avLst/>
+          </a:prstGeom>
+          <a:ln>
+            <a:solidFill>
+              <a:schemeClr val="tx1"/>
+            </a:solidFill>
+          </a:ln>
+        </p:spPr>
+        <p:txBody>
+          <a:bodyPr wrap="square">
+            <a:spAutoFit/>
+          </a:bodyPr>
+          <a:lstStyle/>
+          <a:p>
+            <a:r>
+              <a:rPr lang="en-US" sz="900" dirty="0"/>
+              <a:t>𝜎</a:t>
+            </a:r>
+            <a:r>
+              <a:rPr lang="en-US" sz="900" baseline="-25000" dirty="0"/>
+              <a:t>𝛴</a:t>
+            </a:r>
+            <a:r>
+              <a:rPr lang="en-US" sz="900" dirty="0"/>
+              <a:t> = √𝛴𝜎</a:t>
+            </a:r>
+            <a:r>
+              <a:rPr lang="en-US" sz="900" baseline="30000" dirty="0"/>
+              <a:t>2</a:t>
+            </a:r>
+          </a:p>
+          <a:p>
+            <a:r>
+              <a:rPr lang="en-US" sz="900" dirty="0"/>
+              <a:t>PTA = ($</a:t>
+            </a:r>
+            <a:r>
+              <a:rPr lang="en-US" sz="900" baseline="-25000" dirty="0"/>
+              <a:t>ceil</a:t>
+            </a:r>
+            <a:r>
+              <a:rPr lang="en-US" sz="900" dirty="0"/>
+              <a:t>-$</a:t>
+            </a:r>
+            <a:r>
+              <a:rPr lang="en-US" sz="900" baseline="-25000" dirty="0"/>
+              <a:t>tar</a:t>
+            </a:r>
+            <a:r>
+              <a:rPr lang="en-US" sz="900" dirty="0"/>
+              <a:t>-$</a:t>
+            </a:r>
+            <a:r>
+              <a:rPr lang="en-US" sz="900" baseline="-25000" dirty="0"/>
+              <a:t>fee</a:t>
+            </a:r>
+            <a:r>
+              <a:rPr lang="en-US" sz="900" dirty="0"/>
+              <a:t>)/%</a:t>
+            </a:r>
+            <a:r>
+              <a:rPr lang="en-US" sz="900" baseline="-25000" dirty="0"/>
+              <a:t>buyer</a:t>
+            </a:r>
+            <a:r>
+              <a:rPr lang="en-US" sz="900" dirty="0"/>
+              <a:t>+$</a:t>
+            </a:r>
+            <a:r>
+              <a:rPr lang="en-US" sz="900" baseline="-25000" dirty="0"/>
+              <a:t>tar</a:t>
+            </a:r>
           </a:p>
         </p:txBody>
       </p:sp>
       <p:grpSp>
         <p:nvGrpSpPr>
-          <p:cNvPr id="24" name="Group 23"/>
+          <p:cNvPr id="14" name="Group 23">
+            <a:extLst>
+              <a:ext uri="{FF2B5EF4-FFF2-40B4-BE49-F238E27FC236}">
+                <a16:creationId xmlns:a16="http://schemas.microsoft.com/office/drawing/2014/main" id="{0B97BD94-130F-4823-A8EF-03512EFB40B2}"/>
+              </a:ext>
+            </a:extLst>
+          </p:cNvPr>
           <p:cNvGrpSpPr/>
           <p:nvPr/>
         </p:nvGrpSpPr>
         <p:grpSpPr>
           <a:xfrm>
-            <a:off x="6035397" y="266862"/>
+            <a:off x="5562278" y="8720556"/>
             <a:ext cx="623881" cy="704569"/>
             <a:chOff x="5457265" y="8247180"/>
             <a:chExt cx="1099812" cy="1242056"/>
@@ -4110,7 +4240,13 @@
         </p:grpSpPr>
         <p:sp>
           <p:nvSpPr>
-            <p:cNvPr id="18" name="Triangle 17"/>
+            <p:cNvPr id="15" name="Triangle 17">
+              <a:extLst>
+                <a:ext uri="{FF2B5EF4-FFF2-40B4-BE49-F238E27FC236}">
+                  <a16:creationId xmlns:a16="http://schemas.microsoft.com/office/drawing/2014/main" id="{16CAE1DE-000E-447A-8F92-4D0C8E8F95FA}"/>
+                </a:ext>
+              </a:extLst>
+            </p:cNvPr>
             <p:cNvSpPr/>
             <p:nvPr/>
           </p:nvSpPr>
@@ -4163,7 +4299,13 @@
         </p:sp>
         <p:sp>
           <p:nvSpPr>
-            <p:cNvPr id="19" name="Rectangle 18"/>
+            <p:cNvPr id="17" name="Rectangle 18">
+              <a:extLst>
+                <a:ext uri="{FF2B5EF4-FFF2-40B4-BE49-F238E27FC236}">
+                  <a16:creationId xmlns:a16="http://schemas.microsoft.com/office/drawing/2014/main" id="{654675E8-FC94-401D-A99D-D3F47D8B8895}"/>
+                </a:ext>
+              </a:extLst>
+            </p:cNvPr>
             <p:cNvSpPr/>
             <p:nvPr/>
           </p:nvSpPr>
@@ -4184,7 +4326,7 @@
             <a:p>
               <a:pPr algn="ctr"/>
               <a:r>
-                <a:rPr lang="en-US" sz="700" smtClean="0">
+                <a:rPr lang="en-US" sz="700" dirty="0">
                   <a:latin typeface="Arial" charset="0"/>
                   <a:ea typeface="Arial" charset="0"/>
                   <a:cs typeface="Arial" charset="0"/>
@@ -4195,24 +4337,25 @@
             <a:p>
               <a:pPr algn="ctr"/>
               <a:r>
-                <a:rPr lang="en-US" sz="700" dirty="0" smtClean="0">
+                <a:rPr lang="en-US" sz="700" dirty="0">
                   <a:latin typeface="Arial" charset="0"/>
                   <a:ea typeface="Arial" charset="0"/>
                   <a:cs typeface="Arial" charset="0"/>
                 </a:rPr>
                 <a:t>LITY</a:t>
               </a:r>
-              <a:endParaRPr lang="en-US" sz="700" dirty="0">
-                <a:latin typeface="Arial" charset="0"/>
-                <a:ea typeface="Arial" charset="0"/>
-                <a:cs typeface="Arial" charset="0"/>
-              </a:endParaRPr>
             </a:p>
           </p:txBody>
         </p:sp>
         <p:sp>
           <p:nvSpPr>
-            <p:cNvPr id="21" name="Rectangle 20"/>
+            <p:cNvPr id="20" name="Rectangle 20">
+              <a:extLst>
+                <a:ext uri="{FF2B5EF4-FFF2-40B4-BE49-F238E27FC236}">
+                  <a16:creationId xmlns:a16="http://schemas.microsoft.com/office/drawing/2014/main" id="{9BF083CE-979A-46A6-B52A-C29EFA7B940E}"/>
+                </a:ext>
+              </a:extLst>
+            </p:cNvPr>
             <p:cNvSpPr/>
             <p:nvPr/>
           </p:nvSpPr>
@@ -4233,7 +4376,7 @@
             <a:p>
               <a:pPr algn="ctr"/>
               <a:r>
-                <a:rPr lang="en-US" sz="700" smtClean="0">
+                <a:rPr lang="en-US" sz="700">
                   <a:latin typeface="Arial" charset="0"/>
                   <a:ea typeface="Arial" charset="0"/>
                   <a:cs typeface="Arial" charset="0"/>
@@ -4250,7 +4393,13 @@
         </p:sp>
         <p:sp>
           <p:nvSpPr>
-            <p:cNvPr id="22" name="Rectangle 21"/>
+            <p:cNvPr id="25" name="Rectangle 21">
+              <a:extLst>
+                <a:ext uri="{FF2B5EF4-FFF2-40B4-BE49-F238E27FC236}">
+                  <a16:creationId xmlns:a16="http://schemas.microsoft.com/office/drawing/2014/main" id="{386F4644-8E6A-415A-B316-D16E7F07124F}"/>
+                </a:ext>
+              </a:extLst>
+            </p:cNvPr>
             <p:cNvSpPr/>
             <p:nvPr/>
           </p:nvSpPr>
@@ -4271,24 +4420,25 @@
             <a:p>
               <a:pPr algn="ctr"/>
               <a:r>
-                <a:rPr lang="en-US" sz="700" dirty="0" smtClean="0">
+                <a:rPr lang="en-US" sz="700" dirty="0">
                   <a:latin typeface="Arial" charset="0"/>
                   <a:ea typeface="Arial" charset="0"/>
                   <a:cs typeface="Arial" charset="0"/>
                 </a:rPr>
                 <a:t>COST</a:t>
               </a:r>
-              <a:endParaRPr lang="en-US" sz="700" dirty="0">
-                <a:latin typeface="Arial" charset="0"/>
-                <a:ea typeface="Arial" charset="0"/>
-                <a:cs typeface="Arial" charset="0"/>
-              </a:endParaRPr>
             </a:p>
           </p:txBody>
         </p:sp>
         <p:sp>
           <p:nvSpPr>
-            <p:cNvPr id="23" name="Rectangle 22"/>
+            <p:cNvPr id="26" name="Rectangle 22">
+              <a:extLst>
+                <a:ext uri="{FF2B5EF4-FFF2-40B4-BE49-F238E27FC236}">
+                  <a16:creationId xmlns:a16="http://schemas.microsoft.com/office/drawing/2014/main" id="{80ABDE9D-C6BE-4031-866B-62853EB956F0}"/>
+                </a:ext>
+              </a:extLst>
+            </p:cNvPr>
             <p:cNvSpPr/>
             <p:nvPr/>
           </p:nvSpPr>
@@ -4309,87 +4459,33 @@
             <a:p>
               <a:pPr algn="ctr"/>
               <a:r>
-                <a:rPr lang="en-US" sz="700" dirty="0" smtClean="0">
+                <a:rPr lang="en-US" sz="700" dirty="0">
                   <a:latin typeface="Arial" charset="0"/>
                   <a:ea typeface="Arial" charset="0"/>
                   <a:cs typeface="Arial" charset="0"/>
                 </a:rPr>
                 <a:t>SCOPE</a:t>
               </a:r>
-              <a:endParaRPr lang="en-US" sz="700" dirty="0">
-                <a:latin typeface="Arial" charset="0"/>
-                <a:ea typeface="Arial" charset="0"/>
-                <a:cs typeface="Arial" charset="0"/>
-              </a:endParaRPr>
             </a:p>
           </p:txBody>
         </p:sp>
       </p:grpSp>
       <p:sp>
         <p:nvSpPr>
-          <p:cNvPr id="2" name="TextBox 1"/>
-          <p:cNvSpPr txBox="1"/>
-          <p:nvPr/>
-        </p:nvSpPr>
-        <p:spPr>
-          <a:xfrm>
-            <a:off x="0" y="9536668"/>
-            <a:ext cx="6858000" cy="246221"/>
-          </a:xfrm>
-          <a:prstGeom prst="rect">
-            <a:avLst/>
-          </a:prstGeom>
-          <a:noFill/>
-        </p:spPr>
-        <p:txBody>
-          <a:bodyPr wrap="square" rtlCol="0">
-            <a:spAutoFit/>
-          </a:bodyPr>
-          <a:lstStyle/>
-          <a:p>
-            <a:pPr algn="ctr"/>
-            <a:r>
-              <a:rPr lang="en-US" sz="1000" dirty="0" smtClean="0"/>
-              <a:t>©</a:t>
-            </a:r>
-            <a:r>
-              <a:rPr lang="en-US" sz="1000" dirty="0" err="1" smtClean="0"/>
-              <a:t>Jörg</a:t>
-            </a:r>
-            <a:r>
-              <a:rPr lang="en-US" sz="1000" dirty="0" smtClean="0"/>
-              <a:t> </a:t>
-            </a:r>
-            <a:r>
-              <a:rPr lang="en-US" sz="1000" dirty="0" err="1" smtClean="0"/>
-              <a:t>Kuharev</a:t>
-            </a:r>
-            <a:r>
-              <a:rPr lang="en-US" sz="1000" dirty="0" smtClean="0"/>
-              <a:t>, 2017, based on PMBOK 5</a:t>
-            </a:r>
-            <a:r>
-              <a:rPr lang="en-US" sz="1000" baseline="30000" dirty="0" smtClean="0"/>
-              <a:t>th</a:t>
-            </a:r>
-            <a:r>
-              <a:rPr lang="en-US" sz="1000" dirty="0" smtClean="0"/>
-              <a:t> Edition</a:t>
-            </a:r>
-            <a:endParaRPr lang="en-US" sz="1000" dirty="0"/>
-          </a:p>
-        </p:txBody>
-      </p:sp>
-      <p:sp>
-        <p:nvSpPr>
-          <p:cNvPr id="11" name="Rectangle 10"/>
+          <p:cNvPr id="27" name="Rectangle 10">
+            <a:extLst>
+              <a:ext uri="{FF2B5EF4-FFF2-40B4-BE49-F238E27FC236}">
+                <a16:creationId xmlns:a16="http://schemas.microsoft.com/office/drawing/2014/main" id="{1B21AF6A-25A5-4558-BF44-3E5DC7AB1A66}"/>
+              </a:ext>
+            </a:extLst>
+          </p:cNvPr>
           <p:cNvSpPr/>
           <p:nvPr/>
         </p:nvSpPr>
         <p:spPr>
           <a:xfrm>
             <a:off x="2105352" y="229387"/>
-            <a:ext cx="4576411" cy="6986528"/>
+            <a:ext cx="4576411" cy="7478970"/>
           </a:xfrm>
           <a:prstGeom prst="rect">
             <a:avLst/>
@@ -4407,20 +4503,12 @@
           <a:lstStyle/>
           <a:p>
             <a:r>
-              <a:rPr lang="en-US" sz="800" b="1" dirty="0" smtClean="0">
-                <a:latin typeface="Arial" charset="0"/>
-                <a:ea typeface="Arial" charset="0"/>
-                <a:cs typeface="Arial" charset="0"/>
-              </a:rPr>
-              <a:t>PMI </a:t>
-            </a:r>
-            <a:r>
-              <a:rPr lang="en-US" sz="800" b="1" dirty="0">
-                <a:latin typeface="Arial" charset="0"/>
-                <a:ea typeface="Arial" charset="0"/>
-                <a:cs typeface="Arial" charset="0"/>
-              </a:rPr>
-              <a:t>Code of Ethics: </a:t>
+              <a:rPr lang="en-US" sz="800" b="1" dirty="0">
+                <a:latin typeface="Arial" charset="0"/>
+                <a:ea typeface="Arial" charset="0"/>
+                <a:cs typeface="Arial" charset="0"/>
+              </a:rPr>
+              <a:t>PMI Code of Ethics: </a:t>
             </a:r>
             <a:r>
               <a:rPr lang="en-US" sz="800" dirty="0">
@@ -4446,16 +4534,270 @@
                 <a:ea typeface="Arial" charset="0"/>
                 <a:cs typeface="Arial" charset="0"/>
               </a:rPr>
-              <a:t>Functional, weak/balanced/strong Matrix, </a:t>
-            </a:r>
-            <a:r>
-              <a:rPr lang="en-US" sz="800" dirty="0" err="1" smtClean="0">
-                <a:latin typeface="Arial" charset="0"/>
-                <a:ea typeface="Arial" charset="0"/>
-                <a:cs typeface="Arial" charset="0"/>
-              </a:rPr>
-              <a:t>Projectized</a:t>
-            </a:r>
+              <a:t>Functional, weak/balanced/strong Matrix, Projectized</a:t>
+            </a:r>
+          </a:p>
+          <a:p>
+            <a:r>
+              <a:rPr lang="en-US" sz="800" b="1" dirty="0">
+                <a:latin typeface="Arial" charset="0"/>
+                <a:ea typeface="Arial" charset="0"/>
+                <a:cs typeface="Arial" charset="0"/>
+              </a:rPr>
+              <a:t>Deming Cycle: </a:t>
+            </a:r>
+            <a:r>
+              <a:rPr lang="en-US" sz="800" dirty="0">
+                <a:latin typeface="Arial" charset="0"/>
+                <a:ea typeface="Arial" charset="0"/>
+                <a:cs typeface="Arial" charset="0"/>
+              </a:rPr>
+              <a:t>Plan, Do Check, Act.</a:t>
+            </a:r>
+          </a:p>
+          <a:p>
+            <a:r>
+              <a:rPr lang="en-US" sz="800" b="1" dirty="0">
+                <a:latin typeface="Arial" charset="0"/>
+                <a:ea typeface="Arial" charset="0"/>
+                <a:cs typeface="Arial" charset="0"/>
+              </a:rPr>
+              <a:t>SMART</a:t>
+            </a:r>
+            <a:r>
+              <a:rPr lang="en-US" sz="800" dirty="0">
+                <a:latin typeface="Arial" charset="0"/>
+                <a:ea typeface="Arial" charset="0"/>
+                <a:cs typeface="Arial" charset="0"/>
+              </a:rPr>
+              <a:t>: Specific Measurable Achievable Realistic Timetable</a:t>
+            </a:r>
+          </a:p>
+          <a:p>
+            <a:endParaRPr lang="en-US" sz="800" b="1" dirty="0">
+              <a:latin typeface="Arial" charset="0"/>
+              <a:ea typeface="Arial" charset="0"/>
+              <a:cs typeface="Arial" charset="0"/>
+            </a:endParaRPr>
+          </a:p>
+          <a:p>
+            <a:r>
+              <a:rPr lang="en-US" sz="800" b="1" dirty="0">
+                <a:latin typeface="Arial" charset="0"/>
+                <a:ea typeface="Arial" charset="0"/>
+                <a:cs typeface="Arial" charset="0"/>
+              </a:rPr>
+              <a:t>Contract Close: </a:t>
+            </a:r>
+            <a:r>
+              <a:rPr lang="en-US" sz="800" dirty="0">
+                <a:latin typeface="Arial" charset="0"/>
+                <a:ea typeface="Arial" charset="0"/>
+                <a:cs typeface="Arial" charset="0"/>
+              </a:rPr>
+              <a:t>Before project close; </a:t>
+            </a:r>
+            <a:r>
+              <a:rPr lang="en-US" sz="800" b="1" dirty="0">
+                <a:latin typeface="Arial" charset="0"/>
+                <a:ea typeface="Arial" charset="0"/>
+                <a:cs typeface="Arial" charset="0"/>
+              </a:rPr>
+              <a:t>Project or Phase Close: </a:t>
+            </a:r>
+            <a:r>
+              <a:rPr lang="en-US" sz="800" dirty="0">
+                <a:latin typeface="Arial" charset="0"/>
+                <a:ea typeface="Arial" charset="0"/>
+                <a:cs typeface="Arial" charset="0"/>
+              </a:rPr>
+              <a:t>Lessons Learned </a:t>
+            </a:r>
+            <a:endParaRPr lang="en-US" sz="800" b="1" dirty="0">
+              <a:latin typeface="Arial" charset="0"/>
+              <a:ea typeface="Arial" charset="0"/>
+              <a:cs typeface="Arial" charset="0"/>
+            </a:endParaRPr>
+          </a:p>
+          <a:p>
+            <a:r>
+              <a:rPr lang="en-US" sz="800" b="1" dirty="0">
+                <a:latin typeface="Arial" charset="0"/>
+                <a:ea typeface="Arial" charset="0"/>
+                <a:cs typeface="Arial" charset="0"/>
+              </a:rPr>
+              <a:t>Change Request: </a:t>
+            </a:r>
+            <a:r>
+              <a:rPr lang="en-US" sz="800" dirty="0">
+                <a:latin typeface="Arial" charset="0"/>
+                <a:ea typeface="Arial" charset="0"/>
+                <a:cs typeface="Arial" charset="0"/>
+              </a:rPr>
+              <a:t>? impact on Scope, Time, Cost, Quality, HR, Risk, Stakeholder, Contracts</a:t>
+            </a:r>
+          </a:p>
+          <a:p>
+            <a:r>
+              <a:rPr lang="en-US" sz="800" b="1" dirty="0">
+                <a:latin typeface="Arial" charset="0"/>
+                <a:ea typeface="Arial" charset="0"/>
+                <a:cs typeface="Arial" charset="0"/>
+              </a:rPr>
+              <a:t>Change Control Systems:</a:t>
+            </a:r>
+            <a:r>
+              <a:rPr lang="en-US" sz="800" dirty="0">
+                <a:latin typeface="Arial" charset="0"/>
+                <a:ea typeface="Arial" charset="0"/>
+                <a:cs typeface="Arial" charset="0"/>
+              </a:rPr>
+              <a:t> Scope, Cost, Schedule, Procurement</a:t>
+            </a:r>
+          </a:p>
+          <a:p>
+            <a:endParaRPr lang="de-DE" sz="800" dirty="0">
+              <a:latin typeface="Arial" charset="0"/>
+              <a:ea typeface="Arial" charset="0"/>
+              <a:cs typeface="Arial" charset="0"/>
+            </a:endParaRPr>
+          </a:p>
+          <a:p>
+            <a:r>
+              <a:rPr lang="de-DE" sz="800" b="1" dirty="0">
+                <a:latin typeface="Arial" charset="0"/>
+                <a:ea typeface="Arial" charset="0"/>
+                <a:cs typeface="Arial" charset="0"/>
+              </a:rPr>
+              <a:t>Fast Tracking:</a:t>
+            </a:r>
+            <a:r>
+              <a:rPr lang="de-DE" sz="800" dirty="0">
+                <a:latin typeface="Arial" charset="0"/>
+                <a:ea typeface="Arial" charset="0"/>
+                <a:cs typeface="Arial" charset="0"/>
+              </a:rPr>
+              <a:t> </a:t>
+            </a:r>
+            <a:r>
+              <a:rPr lang="de-DE" sz="800" dirty="0" err="1">
+                <a:latin typeface="Arial" charset="0"/>
+                <a:ea typeface="Arial" charset="0"/>
+                <a:cs typeface="Arial" charset="0"/>
+              </a:rPr>
+              <a:t>parallelize</a:t>
+            </a:r>
+            <a:r>
+              <a:rPr lang="de-DE" sz="800" dirty="0">
+                <a:latin typeface="Arial" charset="0"/>
+                <a:ea typeface="Arial" charset="0"/>
+                <a:cs typeface="Arial" charset="0"/>
+              </a:rPr>
+              <a:t> </a:t>
+            </a:r>
+            <a:r>
+              <a:rPr lang="de-DE" sz="800" dirty="0" err="1">
+                <a:latin typeface="Arial" charset="0"/>
+                <a:ea typeface="Arial" charset="0"/>
+                <a:cs typeface="Arial" charset="0"/>
+              </a:rPr>
+              <a:t>activities</a:t>
+            </a:r>
+            <a:r>
+              <a:rPr lang="de-DE" sz="800" dirty="0">
+                <a:latin typeface="Arial" charset="0"/>
+                <a:ea typeface="Arial" charset="0"/>
+                <a:cs typeface="Arial" charset="0"/>
+              </a:rPr>
+              <a:t> on </a:t>
+            </a:r>
+            <a:r>
+              <a:rPr lang="de-DE" sz="800" dirty="0" err="1">
+                <a:latin typeface="Arial" charset="0"/>
+                <a:ea typeface="Arial" charset="0"/>
+                <a:cs typeface="Arial" charset="0"/>
+              </a:rPr>
+              <a:t>critical</a:t>
+            </a:r>
+            <a:r>
+              <a:rPr lang="de-DE" sz="800" dirty="0">
+                <a:latin typeface="Arial" charset="0"/>
+                <a:ea typeface="Arial" charset="0"/>
+                <a:cs typeface="Arial" charset="0"/>
+              </a:rPr>
+              <a:t> </a:t>
+            </a:r>
+            <a:r>
+              <a:rPr lang="de-DE" sz="800" dirty="0" err="1">
+                <a:latin typeface="Arial" charset="0"/>
+                <a:ea typeface="Arial" charset="0"/>
+                <a:cs typeface="Arial" charset="0"/>
+              </a:rPr>
+              <a:t>path</a:t>
+            </a:r>
+            <a:r>
+              <a:rPr lang="de-DE" sz="800" dirty="0">
+                <a:latin typeface="Arial" charset="0"/>
+                <a:ea typeface="Arial" charset="0"/>
+                <a:cs typeface="Arial" charset="0"/>
+              </a:rPr>
+              <a:t>, </a:t>
+            </a:r>
+            <a:r>
+              <a:rPr lang="de-DE" sz="800" b="1" dirty="0" err="1">
+                <a:latin typeface="Arial" charset="0"/>
+                <a:ea typeface="Arial" charset="0"/>
+                <a:cs typeface="Arial" charset="0"/>
+              </a:rPr>
+              <a:t>Crashing</a:t>
+            </a:r>
+            <a:r>
+              <a:rPr lang="de-DE" sz="800" b="1" dirty="0">
+                <a:latin typeface="Arial" charset="0"/>
+                <a:ea typeface="Arial" charset="0"/>
+                <a:cs typeface="Arial" charset="0"/>
+              </a:rPr>
+              <a:t>:</a:t>
+            </a:r>
+            <a:r>
+              <a:rPr lang="de-DE" sz="800" dirty="0">
+                <a:latin typeface="Arial" charset="0"/>
+                <a:ea typeface="Arial" charset="0"/>
+                <a:cs typeface="Arial" charset="0"/>
+              </a:rPr>
+              <a:t> </a:t>
+            </a:r>
+            <a:r>
+              <a:rPr lang="de-DE" sz="800" dirty="0" err="1">
+                <a:latin typeface="Arial" charset="0"/>
+                <a:ea typeface="Arial" charset="0"/>
+                <a:cs typeface="Arial" charset="0"/>
+              </a:rPr>
+              <a:t>add</a:t>
+            </a:r>
+            <a:r>
+              <a:rPr lang="de-DE" sz="800" dirty="0">
+                <a:latin typeface="Arial" charset="0"/>
+                <a:ea typeface="Arial" charset="0"/>
+                <a:cs typeface="Arial" charset="0"/>
+              </a:rPr>
+              <a:t> extra </a:t>
+            </a:r>
+            <a:r>
+              <a:rPr lang="de-DE" sz="800" dirty="0" err="1">
+                <a:latin typeface="Arial" charset="0"/>
+                <a:ea typeface="Arial" charset="0"/>
+                <a:cs typeface="Arial" charset="0"/>
+              </a:rPr>
+              <a:t>resources</a:t>
+            </a:r>
+            <a:endParaRPr lang="de-DE" sz="800" dirty="0">
+              <a:latin typeface="Arial" charset="0"/>
+              <a:ea typeface="Arial" charset="0"/>
+              <a:cs typeface="Arial" charset="0"/>
+            </a:endParaRPr>
+          </a:p>
+          <a:p>
             <a:endParaRPr lang="en-US" sz="800" dirty="0">
               <a:latin typeface="Arial" charset="0"/>
               <a:ea typeface="Arial" charset="0"/>
@@ -4464,54 +4806,459 @@
           </a:p>
           <a:p>
             <a:r>
-              <a:rPr lang="en-US" sz="800" b="1" dirty="0" smtClean="0">
-                <a:latin typeface="Arial" charset="0"/>
-                <a:ea typeface="Arial" charset="0"/>
-                <a:cs typeface="Arial" charset="0"/>
-              </a:rPr>
-              <a:t>Deming </a:t>
-            </a:r>
-            <a:r>
-              <a:rPr lang="en-US" sz="800" b="1" dirty="0">
-                <a:latin typeface="Arial" charset="0"/>
-                <a:ea typeface="Arial" charset="0"/>
-                <a:cs typeface="Arial" charset="0"/>
-              </a:rPr>
-              <a:t>Cycle: </a:t>
-            </a:r>
-            <a:r>
-              <a:rPr lang="en-US" sz="800" dirty="0">
-                <a:latin typeface="Arial" charset="0"/>
-                <a:ea typeface="Arial" charset="0"/>
-                <a:cs typeface="Arial" charset="0"/>
-              </a:rPr>
-              <a:t>Plan, Do Check, Act</a:t>
-            </a:r>
-            <a:r>
-              <a:rPr lang="en-US" sz="800" dirty="0" smtClean="0">
-                <a:latin typeface="Arial" charset="0"/>
-                <a:ea typeface="Arial" charset="0"/>
-                <a:cs typeface="Arial" charset="0"/>
-              </a:rPr>
-              <a:t>.</a:t>
-            </a:r>
-          </a:p>
-          <a:p>
-            <a:r>
-              <a:rPr lang="en-US" sz="800" b="1" dirty="0" smtClean="0">
-                <a:latin typeface="Arial" charset="0"/>
-                <a:ea typeface="Arial" charset="0"/>
-                <a:cs typeface="Arial" charset="0"/>
-              </a:rPr>
-              <a:t>SMART</a:t>
-            </a:r>
-            <a:r>
-              <a:rPr lang="en-US" sz="800" dirty="0" smtClean="0">
-                <a:latin typeface="Arial" charset="0"/>
-                <a:ea typeface="Arial" charset="0"/>
-                <a:cs typeface="Arial" charset="0"/>
-              </a:rPr>
-              <a:t>: Specific Measurable Achievable Realistic Timetable</a:t>
+              <a:rPr lang="en-US" sz="800" b="1" dirty="0">
+                <a:latin typeface="Arial" charset="0"/>
+                <a:ea typeface="Arial" charset="0"/>
+                <a:cs typeface="Arial" charset="0"/>
+              </a:rPr>
+              <a:t>Cost Estimating Accuracy: ROM: </a:t>
+            </a:r>
+            <a:r>
+              <a:rPr lang="en-US" sz="800" dirty="0">
+                <a:latin typeface="Arial" charset="0"/>
+                <a:ea typeface="Arial" charset="0"/>
+                <a:cs typeface="Arial" charset="0"/>
+              </a:rPr>
+              <a:t>-25%/+75% </a:t>
+            </a:r>
+            <a:r>
+              <a:rPr lang="en-US" sz="800" b="1" dirty="0">
+                <a:latin typeface="Arial" charset="0"/>
+                <a:ea typeface="Arial" charset="0"/>
+                <a:cs typeface="Arial" charset="0"/>
+              </a:rPr>
+              <a:t>Budgetary: </a:t>
+            </a:r>
+            <a:r>
+              <a:rPr lang="en-US" sz="800" dirty="0">
+                <a:latin typeface="Arial" charset="0"/>
+                <a:ea typeface="Arial" charset="0"/>
+                <a:cs typeface="Arial" charset="0"/>
+              </a:rPr>
+              <a:t>-10%/+25%</a:t>
+            </a:r>
+            <a:r>
+              <a:rPr lang="en-US" sz="800" b="1" dirty="0">
+                <a:latin typeface="Arial" charset="0"/>
+                <a:ea typeface="Arial" charset="0"/>
+                <a:cs typeface="Arial" charset="0"/>
+              </a:rPr>
+              <a:t>Definitive: </a:t>
+            </a:r>
+            <a:r>
+              <a:rPr lang="en-US" sz="800" dirty="0">
+                <a:latin typeface="Arial" charset="0"/>
+                <a:ea typeface="Arial" charset="0"/>
+                <a:cs typeface="Arial" charset="0"/>
+              </a:rPr>
+              <a:t>-5%/+10%</a:t>
+            </a:r>
+          </a:p>
+          <a:p>
+            <a:r>
+              <a:rPr lang="en-US" sz="800" b="1" dirty="0">
+                <a:latin typeface="Arial" charset="0"/>
+                <a:ea typeface="Arial" charset="0"/>
+                <a:cs typeface="Arial" charset="0"/>
+              </a:rPr>
+              <a:t>Cost Budget </a:t>
+            </a:r>
+            <a:r>
+              <a:rPr lang="en-US" sz="800" dirty="0">
+                <a:latin typeface="Arial" charset="0"/>
+                <a:ea typeface="Arial" charset="0"/>
+                <a:cs typeface="Arial" charset="0"/>
+              </a:rPr>
+              <a:t>= Mgt. Reserve + (</a:t>
+            </a:r>
+            <a:r>
+              <a:rPr lang="en-US" sz="800" b="1" dirty="0">
+                <a:latin typeface="Arial" charset="0"/>
+                <a:ea typeface="Arial" charset="0"/>
+                <a:cs typeface="Arial" charset="0"/>
+              </a:rPr>
+              <a:t>Cost Baseline</a:t>
+            </a:r>
+            <a:r>
+              <a:rPr lang="en-US" sz="800" dirty="0">
+                <a:latin typeface="Arial" charset="0"/>
+                <a:ea typeface="Arial" charset="0"/>
+                <a:cs typeface="Arial" charset="0"/>
+              </a:rPr>
+              <a:t> = Project Estimates + Contingency Reserve)</a:t>
+            </a:r>
+          </a:p>
+          <a:p>
+            <a:endParaRPr lang="en-US" sz="800" b="1" dirty="0">
+              <a:latin typeface="Arial" charset="0"/>
+              <a:ea typeface="Arial" charset="0"/>
+              <a:cs typeface="Arial" charset="0"/>
+            </a:endParaRPr>
+          </a:p>
+          <a:p>
+            <a:r>
+              <a:rPr lang="en-US" sz="800" b="1" dirty="0">
+                <a:latin typeface="Arial" charset="0"/>
+                <a:ea typeface="Arial" charset="0"/>
+                <a:cs typeface="Arial" charset="0"/>
+              </a:rPr>
+              <a:t>Ishikawa </a:t>
+            </a:r>
+            <a:r>
+              <a:rPr lang="en-US" sz="800" dirty="0">
+                <a:latin typeface="Arial" charset="0"/>
+                <a:ea typeface="Arial" charset="0"/>
+                <a:cs typeface="Arial" charset="0"/>
+              </a:rPr>
+              <a:t>= Fishbone Diagram: cause and effect. </a:t>
+            </a:r>
+          </a:p>
+          <a:p>
+            <a:r>
+              <a:rPr lang="en-US" sz="800" b="1" dirty="0">
+                <a:latin typeface="Arial" charset="0"/>
+                <a:ea typeface="Arial" charset="0"/>
+                <a:cs typeface="Arial" charset="0"/>
+              </a:rPr>
+              <a:t>Pareto Diagram: </a:t>
+            </a:r>
+            <a:r>
+              <a:rPr lang="en-US" sz="800" dirty="0">
+                <a:latin typeface="Arial" charset="0"/>
+                <a:ea typeface="Arial" charset="0"/>
+                <a:cs typeface="Arial" charset="0"/>
+              </a:rPr>
+              <a:t>Identify problems and frequency. 80/20 Rule. </a:t>
+            </a:r>
+          </a:p>
+          <a:p>
+            <a:r>
+              <a:rPr lang="en-US" sz="800" b="1" dirty="0">
+                <a:latin typeface="Arial" charset="0"/>
+                <a:ea typeface="Arial" charset="0"/>
+                <a:cs typeface="Arial" charset="0"/>
+              </a:rPr>
+              <a:t>Flow Charts; Control Charts</a:t>
+            </a:r>
+            <a:r>
+              <a:rPr lang="en-US" sz="800" dirty="0">
+                <a:latin typeface="Arial" charset="0"/>
+                <a:ea typeface="Arial" charset="0"/>
+                <a:cs typeface="Arial" charset="0"/>
+              </a:rPr>
+              <a:t>. </a:t>
+            </a:r>
+          </a:p>
+          <a:p>
+            <a:r>
+              <a:rPr lang="en-US" sz="800" b="1" dirty="0">
+                <a:latin typeface="Arial" charset="0"/>
+                <a:ea typeface="Arial" charset="0"/>
+                <a:cs typeface="Arial" charset="0"/>
+              </a:rPr>
+              <a:t>Just in Time: </a:t>
+            </a:r>
+            <a:r>
+              <a:rPr lang="en-US" sz="800" dirty="0">
+                <a:latin typeface="Arial" charset="0"/>
+                <a:ea typeface="Arial" charset="0"/>
+                <a:cs typeface="Arial" charset="0"/>
+              </a:rPr>
+              <a:t>Reduces inventory; requires additional quality control. </a:t>
+            </a:r>
+          </a:p>
+          <a:p>
+            <a:r>
+              <a:rPr lang="en-US" sz="800" b="1" dirty="0">
+                <a:latin typeface="Arial" charset="0"/>
+                <a:ea typeface="Arial" charset="0"/>
+                <a:cs typeface="Arial" charset="0"/>
+              </a:rPr>
+              <a:t>Quality Theories: </a:t>
+            </a:r>
+            <a:r>
+              <a:rPr lang="en-US" sz="800" dirty="0">
+                <a:latin typeface="Arial" charset="0"/>
+                <a:ea typeface="Arial" charset="0"/>
+                <a:cs typeface="Arial" charset="0"/>
+              </a:rPr>
+              <a:t>Kaizen: continuous improvements, Six Sigma, TQM, </a:t>
+            </a:r>
+            <a:r>
+              <a:rPr lang="en-US" sz="800" b="1" dirty="0">
+                <a:latin typeface="Arial" charset="0"/>
+                <a:ea typeface="Arial" charset="0"/>
+                <a:cs typeface="Arial" charset="0"/>
+              </a:rPr>
+              <a:t>Crosby</a:t>
+            </a:r>
+            <a:r>
+              <a:rPr lang="en-US" sz="800" dirty="0">
+                <a:latin typeface="Arial" charset="0"/>
+                <a:ea typeface="Arial" charset="0"/>
+                <a:cs typeface="Arial" charset="0"/>
+              </a:rPr>
+              <a:t>: zero defects</a:t>
+            </a:r>
+          </a:p>
+          <a:p>
+            <a:r>
+              <a:rPr lang="en-US" sz="800" b="1" dirty="0">
+                <a:latin typeface="Arial" charset="0"/>
+                <a:ea typeface="Arial" charset="0"/>
+                <a:cs typeface="Arial" charset="0"/>
+              </a:rPr>
+              <a:t>Variables Sampling</a:t>
+            </a:r>
+            <a:r>
+              <a:rPr lang="en-US" sz="800" dirty="0">
+                <a:latin typeface="Arial" charset="0"/>
+                <a:ea typeface="Arial" charset="0"/>
+                <a:cs typeface="Arial" charset="0"/>
+              </a:rPr>
+              <a:t>: rated degree of conformity, </a:t>
+            </a:r>
+            <a:r>
+              <a:rPr lang="en-US" sz="800" b="1" dirty="0">
+                <a:latin typeface="Arial" charset="0"/>
+                <a:ea typeface="Arial" charset="0"/>
+                <a:cs typeface="Arial" charset="0"/>
+              </a:rPr>
+              <a:t>Attribute Sampling</a:t>
+            </a:r>
+            <a:r>
+              <a:rPr lang="en-US" sz="800" dirty="0">
+                <a:latin typeface="Arial" charset="0"/>
+                <a:ea typeface="Arial" charset="0"/>
+                <a:cs typeface="Arial" charset="0"/>
+              </a:rPr>
+              <a:t>: accepted or not</a:t>
+            </a:r>
+          </a:p>
+          <a:p>
+            <a:endParaRPr lang="en-US" sz="800" b="1" dirty="0">
+              <a:latin typeface="Arial" charset="0"/>
+              <a:ea typeface="Arial" charset="0"/>
+              <a:cs typeface="Arial" charset="0"/>
+            </a:endParaRPr>
+          </a:p>
+          <a:p>
+            <a:r>
+              <a:rPr lang="en-US" sz="800" b="1" dirty="0">
+                <a:latin typeface="Arial" charset="0"/>
+                <a:ea typeface="Arial" charset="0"/>
+                <a:cs typeface="Arial" charset="0"/>
+              </a:rPr>
+              <a:t>Maslow’s Hierarchy of Needs: </a:t>
+            </a:r>
+            <a:r>
+              <a:rPr lang="en-US" sz="800" dirty="0">
+                <a:latin typeface="Arial" charset="0"/>
+                <a:ea typeface="Arial" charset="0"/>
+                <a:cs typeface="Arial" charset="0"/>
+              </a:rPr>
+              <a:t>Physiological, Safety, Social, Self -esteem, Self-actualization. </a:t>
+            </a:r>
+          </a:p>
+          <a:p>
+            <a:r>
+              <a:rPr lang="en-US" sz="800" b="1" dirty="0">
+                <a:latin typeface="Arial" charset="0"/>
+                <a:ea typeface="Arial" charset="0"/>
+                <a:cs typeface="Arial" charset="0"/>
+              </a:rPr>
+              <a:t>McClelland’s Theory of Needs:</a:t>
+            </a:r>
+            <a:r>
+              <a:rPr lang="en-US" sz="800" dirty="0">
+                <a:latin typeface="Arial" charset="0"/>
+                <a:ea typeface="Arial" charset="0"/>
+                <a:cs typeface="Arial" charset="0"/>
+              </a:rPr>
+              <a:t> over time, achievement, affiliation, power, Apperception test</a:t>
+            </a:r>
+          </a:p>
+          <a:p>
+            <a:r>
+              <a:rPr lang="en-US" sz="800" b="1" dirty="0">
+                <a:latin typeface="Arial" charset="0"/>
+                <a:ea typeface="Arial" charset="0"/>
+                <a:cs typeface="Arial" charset="0"/>
+              </a:rPr>
+              <a:t>McGregor’s X &amp; Y: </a:t>
+            </a:r>
+            <a:r>
+              <a:rPr lang="en-US" sz="800" dirty="0">
+                <a:latin typeface="Arial" charset="0"/>
+                <a:ea typeface="Arial" charset="0"/>
+                <a:cs typeface="Arial" charset="0"/>
+              </a:rPr>
+              <a:t>X: bad, lazy-&gt; micromanagement; Y: self-directed</a:t>
+            </a:r>
+          </a:p>
+          <a:p>
+            <a:r>
+              <a:rPr lang="en-US" sz="800" b="1" dirty="0" err="1">
+                <a:latin typeface="Arial" charset="0"/>
+                <a:ea typeface="Arial" charset="0"/>
+                <a:cs typeface="Arial" charset="0"/>
+              </a:rPr>
+              <a:t>Ouchi’s</a:t>
+            </a:r>
+            <a:r>
+              <a:rPr lang="en-US" sz="800" b="1" dirty="0">
+                <a:latin typeface="Arial" charset="0"/>
+                <a:ea typeface="Arial" charset="0"/>
+                <a:cs typeface="Arial" charset="0"/>
+              </a:rPr>
+              <a:t> Theo. Z:</a:t>
+            </a:r>
+            <a:r>
+              <a:rPr lang="en-US" sz="800" dirty="0">
+                <a:latin typeface="Arial" charset="0"/>
+                <a:ea typeface="Arial" charset="0"/>
+                <a:cs typeface="Arial" charset="0"/>
+              </a:rPr>
+              <a:t> People are X + Y, motivated by commitment, opportunity advancement. </a:t>
+            </a:r>
+          </a:p>
+          <a:p>
+            <a:r>
+              <a:rPr lang="en-US" sz="800" b="1" dirty="0">
+                <a:latin typeface="Arial" charset="0"/>
+                <a:ea typeface="Arial" charset="0"/>
+                <a:cs typeface="Arial" charset="0"/>
+              </a:rPr>
+              <a:t>Herzberg’s Theory of Motivation: </a:t>
+            </a:r>
+            <a:r>
+              <a:rPr lang="en-US" sz="800" dirty="0">
+                <a:latin typeface="Arial" charset="0"/>
+                <a:ea typeface="Arial" charset="0"/>
+                <a:cs typeface="Arial" charset="0"/>
+              </a:rPr>
+              <a:t>Hygiene factors, Motivating Agents. </a:t>
+            </a:r>
+          </a:p>
+          <a:p>
+            <a:r>
+              <a:rPr lang="en-US" sz="800" b="1" dirty="0">
+                <a:latin typeface="Arial" charset="0"/>
+                <a:ea typeface="Arial" charset="0"/>
+                <a:cs typeface="Arial" charset="0"/>
+              </a:rPr>
+              <a:t>Vroom’s Expectancy Theory:</a:t>
+            </a:r>
+            <a:r>
+              <a:rPr lang="en-US" sz="800" dirty="0">
+                <a:latin typeface="Arial" charset="0"/>
+                <a:ea typeface="Arial" charset="0"/>
+                <a:cs typeface="Arial" charset="0"/>
+              </a:rPr>
+              <a:t> People behave based on their belief on what will be the result.</a:t>
+            </a:r>
+          </a:p>
+          <a:p>
+            <a:r>
+              <a:rPr lang="en-US" sz="800" b="1" dirty="0">
+                <a:latin typeface="Arial" charset="0"/>
+                <a:ea typeface="Arial" charset="0"/>
+                <a:cs typeface="Arial" charset="0"/>
+              </a:rPr>
+              <a:t>Halo Effect:</a:t>
+            </a:r>
+            <a:r>
+              <a:rPr lang="en-US" sz="800" dirty="0">
+                <a:latin typeface="Arial" charset="0"/>
+                <a:ea typeface="Arial" charset="0"/>
+                <a:cs typeface="Arial" charset="0"/>
+              </a:rPr>
+              <a:t> all opinions formed by one component, good engineer must be a good manager.</a:t>
+            </a:r>
+          </a:p>
+          <a:p>
+            <a:r>
+              <a:rPr lang="en-US" sz="800" b="1" dirty="0">
+                <a:latin typeface="Arial" charset="0"/>
+                <a:cs typeface="Arial" charset="0"/>
+              </a:rPr>
+              <a:t>Tuckman:</a:t>
+            </a:r>
+            <a:r>
+              <a:rPr lang="en-US" sz="800" dirty="0">
+                <a:latin typeface="Arial" charset="0"/>
+                <a:ea typeface="Arial" charset="0"/>
+                <a:cs typeface="Arial" charset="0"/>
+              </a:rPr>
+              <a:t> Forming, Storming (resisting), Norming (supporting), Performing, Adjourning</a:t>
+            </a:r>
+          </a:p>
+          <a:p>
+            <a:r>
+              <a:rPr lang="en-US" sz="800" b="1" dirty="0">
+                <a:latin typeface="Arial" charset="0"/>
+                <a:ea typeface="Arial" charset="0"/>
+                <a:cs typeface="Arial" charset="0"/>
+              </a:rPr>
+              <a:t>Leadership: </a:t>
+            </a:r>
+            <a:r>
+              <a:rPr lang="en-US" sz="800" dirty="0">
+                <a:latin typeface="Arial" charset="0"/>
+                <a:ea typeface="Arial" charset="0"/>
+                <a:cs typeface="Arial" charset="0"/>
+              </a:rPr>
+              <a:t>Directing, Facilitating, Coaching, Supporting, Autocratic, Consultative, Consensus.</a:t>
+            </a:r>
+          </a:p>
+          <a:p>
+            <a:r>
+              <a:rPr lang="en-US" sz="800" b="1" dirty="0">
+                <a:latin typeface="Arial" charset="0"/>
+                <a:ea typeface="Arial" charset="0"/>
+                <a:cs typeface="Arial" charset="0"/>
+              </a:rPr>
+              <a:t>Team Roles: </a:t>
+            </a:r>
+            <a:r>
+              <a:rPr lang="en-US" sz="700" dirty="0">
+                <a:latin typeface="Arial" charset="0"/>
+                <a:ea typeface="Arial" charset="0"/>
+                <a:cs typeface="Arial" charset="0"/>
+              </a:rPr>
+              <a:t>Initiator, </a:t>
+            </a:r>
+            <a:r>
+              <a:rPr lang="en-US" sz="700" dirty="0" err="1">
+                <a:latin typeface="Arial" charset="0"/>
+                <a:ea typeface="Arial" charset="0"/>
+                <a:cs typeface="Arial" charset="0"/>
+              </a:rPr>
+              <a:t>Inf.Seeker</a:t>
+            </a:r>
+            <a:r>
+              <a:rPr lang="en-US" sz="700" dirty="0">
+                <a:latin typeface="Arial" charset="0"/>
+                <a:ea typeface="Arial" charset="0"/>
+                <a:cs typeface="Arial" charset="0"/>
+              </a:rPr>
+              <a:t>, </a:t>
+            </a:r>
+            <a:r>
+              <a:rPr lang="en-US" sz="700" dirty="0" err="1">
+                <a:latin typeface="Arial" charset="0"/>
+                <a:ea typeface="Arial" charset="0"/>
+                <a:cs typeface="Arial" charset="0"/>
+              </a:rPr>
+              <a:t>Inf.Giver</a:t>
+            </a:r>
+            <a:r>
+              <a:rPr lang="en-US" sz="700" dirty="0">
+                <a:latin typeface="Arial" charset="0"/>
+                <a:ea typeface="Arial" charset="0"/>
+                <a:cs typeface="Arial" charset="0"/>
+              </a:rPr>
+              <a:t>, Encourager, Clarifier, Gate Keeper, Harmonizer, Summarizer</a:t>
             </a:r>
             <a:endParaRPr lang="en-US" sz="800" dirty="0">
               <a:latin typeface="Arial" charset="0"/>
@@ -4520,45 +5267,92 @@
             </a:endParaRPr>
           </a:p>
           <a:p>
-            <a:endParaRPr lang="en-US" sz="800" b="1" dirty="0" smtClean="0">
-              <a:latin typeface="Arial" charset="0"/>
-              <a:ea typeface="Arial" charset="0"/>
-              <a:cs typeface="Arial" charset="0"/>
-            </a:endParaRPr>
-          </a:p>
-          <a:p>
-            <a:r>
-              <a:rPr lang="en-US" sz="800" b="1" dirty="0">
-                <a:latin typeface="Arial" charset="0"/>
-                <a:ea typeface="Arial" charset="0"/>
-                <a:cs typeface="Arial" charset="0"/>
-              </a:rPr>
-              <a:t>Contract Close: </a:t>
-            </a:r>
-            <a:r>
-              <a:rPr lang="en-US" sz="800" dirty="0">
-                <a:latin typeface="Arial" charset="0"/>
-                <a:ea typeface="Arial" charset="0"/>
-                <a:cs typeface="Arial" charset="0"/>
-              </a:rPr>
-              <a:t>Before project close; </a:t>
-            </a:r>
-            <a:r>
-              <a:rPr lang="en-US" sz="800" b="1" dirty="0">
-                <a:latin typeface="Arial" charset="0"/>
-                <a:ea typeface="Arial" charset="0"/>
-                <a:cs typeface="Arial" charset="0"/>
-              </a:rPr>
-              <a:t>Project or Phase Close: </a:t>
-            </a:r>
-            <a:r>
-              <a:rPr lang="en-US" sz="800" dirty="0">
-                <a:latin typeface="Arial" charset="0"/>
-                <a:ea typeface="Arial" charset="0"/>
-                <a:cs typeface="Arial" charset="0"/>
-              </a:rPr>
-              <a:t>Lessons Learned </a:t>
-            </a:r>
+            <a:r>
+              <a:rPr lang="en-US" sz="800" b="1" dirty="0">
+                <a:latin typeface="Arial" charset="0"/>
+                <a:ea typeface="Arial" charset="0"/>
+                <a:cs typeface="Arial" charset="0"/>
+              </a:rPr>
+              <a:t>Manager Powers: </a:t>
+            </a:r>
+            <a:r>
+              <a:rPr lang="en-US" sz="800" dirty="0">
+                <a:latin typeface="Arial" charset="0"/>
+                <a:ea typeface="Arial" charset="0"/>
+                <a:cs typeface="Arial" charset="0"/>
+              </a:rPr>
+              <a:t>Formal (legitimate,) Reward, Penalty (coercive), Expert, Referent. </a:t>
+            </a:r>
+          </a:p>
+          <a:p>
+            <a:r>
+              <a:rPr lang="en-US" sz="800" b="1" dirty="0">
+                <a:latin typeface="Arial" charset="0"/>
+                <a:ea typeface="Arial" charset="0"/>
+                <a:cs typeface="Arial" charset="0"/>
+              </a:rPr>
+              <a:t>Conflict Management: win-win: </a:t>
+            </a:r>
+            <a:r>
+              <a:rPr lang="en-US" sz="800" dirty="0">
+                <a:latin typeface="Arial" charset="0"/>
+                <a:ea typeface="Arial" charset="0"/>
+                <a:cs typeface="Arial" charset="0"/>
+              </a:rPr>
+              <a:t>Confront (problem solving.), Collaborate; </a:t>
+            </a:r>
+            <a:r>
+              <a:rPr lang="en-US" sz="800" b="1" dirty="0">
+                <a:latin typeface="Arial" charset="0"/>
+                <a:ea typeface="Arial" charset="0"/>
+                <a:cs typeface="Arial" charset="0"/>
+              </a:rPr>
+              <a:t>win-lose:</a:t>
+            </a:r>
+            <a:r>
+              <a:rPr lang="en-US" sz="800" dirty="0">
+                <a:latin typeface="Arial" charset="0"/>
+                <a:ea typeface="Arial" charset="0"/>
+                <a:cs typeface="Arial" charset="0"/>
+              </a:rPr>
+              <a:t> Force</a:t>
+            </a:r>
+          </a:p>
+          <a:p>
+            <a:r>
+              <a:rPr lang="en-US" sz="800" b="1" dirty="0">
+                <a:latin typeface="Arial" charset="0"/>
+                <a:ea typeface="Arial" charset="0"/>
+                <a:cs typeface="Arial" charset="0"/>
+              </a:rPr>
+              <a:t>yield-lose:</a:t>
+            </a:r>
+            <a:r>
+              <a:rPr lang="en-US" sz="800" dirty="0">
+                <a:latin typeface="Arial" charset="0"/>
+                <a:ea typeface="Arial" charset="0"/>
+                <a:cs typeface="Arial" charset="0"/>
+              </a:rPr>
+              <a:t> Withdraw (avoid); </a:t>
+            </a:r>
+            <a:r>
+              <a:rPr lang="en-US" sz="800" b="1" dirty="0">
+                <a:latin typeface="Arial" charset="0"/>
+                <a:ea typeface="Arial" charset="0"/>
+                <a:cs typeface="Arial" charset="0"/>
+              </a:rPr>
+              <a:t>lose-lose:</a:t>
+            </a:r>
+            <a:r>
+              <a:rPr lang="en-US" sz="800" dirty="0">
+                <a:latin typeface="Arial" charset="0"/>
+                <a:ea typeface="Arial" charset="0"/>
+                <a:cs typeface="Arial" charset="0"/>
+              </a:rPr>
+              <a:t> Smooth (accommodate), Compromise</a:t>
+            </a:r>
+          </a:p>
+          <a:p>
             <a:endParaRPr lang="en-US" sz="800" b="1" dirty="0">
               <a:latin typeface="Arial" charset="0"/>
               <a:ea typeface="Arial" charset="0"/>
@@ -4567,46 +5361,194 @@
           </a:p>
           <a:p>
             <a:r>
-              <a:rPr lang="en-US" sz="800" b="1" dirty="0" smtClean="0">
-                <a:latin typeface="Arial" charset="0"/>
-                <a:ea typeface="Arial" charset="0"/>
-                <a:cs typeface="Arial" charset="0"/>
-              </a:rPr>
-              <a:t>Change </a:t>
-            </a:r>
-            <a:r>
-              <a:rPr lang="en-US" sz="800" b="1" dirty="0">
-                <a:latin typeface="Arial" charset="0"/>
-                <a:ea typeface="Arial" charset="0"/>
-                <a:cs typeface="Arial" charset="0"/>
-              </a:rPr>
-              <a:t>Request: </a:t>
-            </a:r>
-            <a:r>
-              <a:rPr lang="en-US" sz="800" dirty="0">
-                <a:latin typeface="Arial" charset="0"/>
-                <a:ea typeface="Arial" charset="0"/>
-                <a:cs typeface="Arial" charset="0"/>
-              </a:rPr>
-              <a:t>? impact on Scope, Time, Cost, Quality, HR, Risk, Stakeholder, Contracts</a:t>
-            </a:r>
-          </a:p>
-          <a:p>
-            <a:r>
-              <a:rPr lang="en-US" sz="800" b="1" dirty="0">
-                <a:latin typeface="Arial" charset="0"/>
-                <a:ea typeface="Arial" charset="0"/>
-                <a:cs typeface="Arial" charset="0"/>
-              </a:rPr>
-              <a:t>Change Control Systems:</a:t>
-            </a:r>
-            <a:r>
-              <a:rPr lang="en-US" sz="800" dirty="0">
-                <a:latin typeface="Arial" charset="0"/>
-                <a:ea typeface="Arial" charset="0"/>
-                <a:cs typeface="Arial" charset="0"/>
-              </a:rPr>
-              <a:t> Scope, Cost, Schedule, Procurement</a:t>
+              <a:rPr lang="en-US" sz="800" b="1" dirty="0">
+                <a:latin typeface="Arial" charset="0"/>
+                <a:ea typeface="Arial" charset="0"/>
+                <a:cs typeface="Arial" charset="0"/>
+              </a:rPr>
+              <a:t>Risk Mgt. Strategies: </a:t>
+            </a:r>
+            <a:r>
+              <a:rPr lang="en-US" sz="800" dirty="0">
+                <a:latin typeface="Arial" charset="0"/>
+                <a:ea typeface="Arial" charset="0"/>
+                <a:cs typeface="Arial" charset="0"/>
+              </a:rPr>
+              <a:t>Avoid, Transfer, Mitigate, Accept, Exploit, Share, Enhance, Accept.</a:t>
+            </a:r>
+          </a:p>
+          <a:p>
+            <a:r>
+              <a:rPr lang="en-US" sz="800" b="1" dirty="0">
+                <a:latin typeface="Arial" charset="0"/>
+                <a:ea typeface="Arial" charset="0"/>
+                <a:cs typeface="Arial" charset="0"/>
+              </a:rPr>
+              <a:t>Qualitative Risk Analysis: </a:t>
+            </a:r>
+            <a:r>
+              <a:rPr lang="en-US" sz="800" dirty="0">
+                <a:latin typeface="Arial" charset="0"/>
+                <a:ea typeface="Arial" charset="0"/>
+                <a:cs typeface="Arial" charset="0"/>
+              </a:rPr>
+              <a:t>Chance and impact of occurrence, prioritized list; ranking.</a:t>
+            </a:r>
+          </a:p>
+          <a:p>
+            <a:r>
+              <a:rPr lang="en-US" sz="800" b="1" dirty="0">
+                <a:latin typeface="Arial" charset="0"/>
+                <a:ea typeface="Arial" charset="0"/>
+                <a:cs typeface="Arial" charset="0"/>
+              </a:rPr>
+              <a:t>Quantitative Risk Analysis: </a:t>
+            </a:r>
+            <a:r>
+              <a:rPr lang="en-US" sz="800" dirty="0">
+                <a:latin typeface="Arial" charset="0"/>
+                <a:ea typeface="Arial" charset="0"/>
+                <a:cs typeface="Arial" charset="0"/>
+              </a:rPr>
+              <a:t>Numerical analysis of probability and impact.</a:t>
+            </a:r>
+          </a:p>
+          <a:p>
+            <a:r>
+              <a:rPr lang="en-US" sz="800" b="1" dirty="0">
+                <a:latin typeface="Arial" charset="0"/>
+                <a:ea typeface="Arial" charset="0"/>
+                <a:cs typeface="Arial" charset="0"/>
+              </a:rPr>
+              <a:t>Tools: </a:t>
+            </a:r>
+            <a:r>
+              <a:rPr lang="en-US" sz="800" dirty="0">
+                <a:latin typeface="Arial" charset="0"/>
+                <a:ea typeface="Arial" charset="0"/>
+                <a:cs typeface="Arial" charset="0"/>
+              </a:rPr>
+              <a:t>Interviews, Sensitivity Analysis, Decision Tree Analysis, Simulation, Monte Carlo.</a:t>
+            </a:r>
+          </a:p>
+          <a:p>
+            <a:r>
+              <a:rPr lang="en-US" sz="800" b="1" dirty="0">
+                <a:latin typeface="Arial" charset="0"/>
+                <a:ea typeface="Arial" charset="0"/>
+                <a:cs typeface="Arial" charset="0"/>
+              </a:rPr>
+              <a:t>Expected Monetary Value = </a:t>
+            </a:r>
+            <a:r>
+              <a:rPr lang="en-US" sz="800" dirty="0">
+                <a:latin typeface="Arial" charset="0"/>
+                <a:ea typeface="Arial" charset="0"/>
+                <a:cs typeface="Arial" charset="0"/>
+              </a:rPr>
+              <a:t>probability * impact; </a:t>
+            </a:r>
+            <a:r>
+              <a:rPr lang="en-US" sz="800" b="1" dirty="0">
+                <a:latin typeface="Arial" charset="0"/>
+                <a:ea typeface="Arial" charset="0"/>
+                <a:cs typeface="Arial" charset="0"/>
+              </a:rPr>
+              <a:t>Contingency Reserve</a:t>
+            </a:r>
+            <a:r>
+              <a:rPr lang="en-US" sz="800" dirty="0">
+                <a:latin typeface="Arial" charset="0"/>
+                <a:ea typeface="Arial" charset="0"/>
+                <a:cs typeface="Arial" charset="0"/>
+              </a:rPr>
+              <a:t> = 𝛴( p * </a:t>
+            </a:r>
+            <a:r>
+              <a:rPr lang="en-US" sz="800" dirty="0" err="1">
+                <a:latin typeface="Arial" charset="0"/>
+                <a:ea typeface="Arial" charset="0"/>
+                <a:cs typeface="Arial" charset="0"/>
+              </a:rPr>
+              <a:t>i</a:t>
+            </a:r>
+            <a:r>
+              <a:rPr lang="en-US" sz="800" dirty="0">
+                <a:latin typeface="Arial" charset="0"/>
+                <a:ea typeface="Arial" charset="0"/>
+                <a:cs typeface="Arial" charset="0"/>
+              </a:rPr>
+              <a:t> )</a:t>
+            </a:r>
+          </a:p>
+          <a:p>
+            <a:r>
+              <a:rPr lang="en-US" sz="800" b="1" dirty="0">
+                <a:latin typeface="Arial" charset="0"/>
+                <a:ea typeface="Arial" charset="0"/>
+                <a:cs typeface="Arial" charset="0"/>
+              </a:rPr>
+              <a:t>Risks: Pure:</a:t>
+            </a:r>
+            <a:r>
+              <a:rPr lang="en-US" sz="800" dirty="0">
+                <a:latin typeface="Arial" charset="0"/>
+                <a:ea typeface="Arial" charset="0"/>
+                <a:cs typeface="Arial" charset="0"/>
+              </a:rPr>
+              <a:t> negative impact only, injury, theft, fire, destruction</a:t>
+            </a:r>
+          </a:p>
+          <a:p>
+            <a:r>
+              <a:rPr lang="en-US" sz="800" b="1" dirty="0">
+                <a:latin typeface="Arial" charset="0"/>
+                <a:ea typeface="Arial" charset="0"/>
+                <a:cs typeface="Arial" charset="0"/>
+              </a:rPr>
+              <a:t>Secondary:</a:t>
+            </a:r>
+            <a:r>
+              <a:rPr lang="en-US" sz="800" dirty="0">
+                <a:latin typeface="Arial" charset="0"/>
+                <a:ea typeface="Arial" charset="0"/>
+                <a:cs typeface="Arial" charset="0"/>
+              </a:rPr>
+              <a:t> risk response creates another risk; </a:t>
+            </a:r>
+            <a:r>
+              <a:rPr lang="en-US" sz="800" b="1" dirty="0">
+                <a:latin typeface="Arial" charset="0"/>
+                <a:ea typeface="Arial" charset="0"/>
+                <a:cs typeface="Arial" charset="0"/>
+              </a:rPr>
+              <a:t>Residual:</a:t>
+            </a:r>
+            <a:r>
+              <a:rPr lang="en-US" sz="800" dirty="0">
+                <a:latin typeface="Arial" charset="0"/>
+                <a:ea typeface="Arial" charset="0"/>
+                <a:cs typeface="Arial" charset="0"/>
+              </a:rPr>
+              <a:t> small generally accepted risk</a:t>
+            </a:r>
+          </a:p>
+          <a:p>
+            <a:r>
+              <a:rPr lang="en-US" sz="800" b="1" dirty="0">
+                <a:latin typeface="Arial" charset="0"/>
+                <a:ea typeface="Arial" charset="0"/>
+                <a:cs typeface="Arial" charset="0"/>
+              </a:rPr>
+              <a:t>Utility Function = Risk Tolerance:</a:t>
+            </a:r>
+            <a:r>
+              <a:rPr lang="en-US" sz="800" dirty="0">
+                <a:latin typeface="Arial" charset="0"/>
+                <a:ea typeface="Arial" charset="0"/>
+                <a:cs typeface="Arial" charset="0"/>
+              </a:rPr>
+              <a:t> willingness to accept risk</a:t>
             </a:r>
           </a:p>
           <a:p>
@@ -4618,270 +5560,56 @@
           </a:p>
           <a:p>
             <a:r>
-              <a:rPr lang="en-US" sz="800" b="1" dirty="0" smtClean="0">
-                <a:latin typeface="Arial" charset="0"/>
-                <a:ea typeface="Arial" charset="0"/>
-                <a:cs typeface="Arial" charset="0"/>
-              </a:rPr>
-              <a:t>Cost </a:t>
-            </a:r>
-            <a:r>
-              <a:rPr lang="en-US" sz="800" b="1" dirty="0">
-                <a:latin typeface="Arial" charset="0"/>
-                <a:ea typeface="Arial" charset="0"/>
-                <a:cs typeface="Arial" charset="0"/>
-              </a:rPr>
-              <a:t>Estimating Accuracy: ROM: </a:t>
-            </a:r>
-            <a:r>
-              <a:rPr lang="en-US" sz="800" dirty="0">
-                <a:latin typeface="Arial" charset="0"/>
-                <a:ea typeface="Arial" charset="0"/>
-                <a:cs typeface="Arial" charset="0"/>
-              </a:rPr>
-              <a:t>-25%/+75% </a:t>
-            </a:r>
-            <a:r>
-              <a:rPr lang="en-US" sz="800" b="1" dirty="0">
-                <a:latin typeface="Arial" charset="0"/>
-                <a:ea typeface="Arial" charset="0"/>
-                <a:cs typeface="Arial" charset="0"/>
-              </a:rPr>
-              <a:t>Budgetary: </a:t>
-            </a:r>
-            <a:r>
-              <a:rPr lang="en-US" sz="800" dirty="0">
-                <a:latin typeface="Arial" charset="0"/>
-                <a:ea typeface="Arial" charset="0"/>
-                <a:cs typeface="Arial" charset="0"/>
-              </a:rPr>
-              <a:t>-10%/+25%</a:t>
-            </a:r>
-            <a:r>
-              <a:rPr lang="en-US" sz="800" b="1" dirty="0">
-                <a:latin typeface="Arial" charset="0"/>
-                <a:ea typeface="Arial" charset="0"/>
-                <a:cs typeface="Arial" charset="0"/>
-              </a:rPr>
-              <a:t>Definitive: </a:t>
-            </a:r>
-            <a:r>
-              <a:rPr lang="en-US" sz="800" dirty="0">
-                <a:latin typeface="Arial" charset="0"/>
-                <a:ea typeface="Arial" charset="0"/>
-                <a:cs typeface="Arial" charset="0"/>
-              </a:rPr>
-              <a:t>-5%/+10%</a:t>
-            </a:r>
-            <a:br>
-              <a:rPr lang="en-US" sz="800" dirty="0">
-                <a:latin typeface="Arial" charset="0"/>
-                <a:ea typeface="Arial" charset="0"/>
-                <a:cs typeface="Arial" charset="0"/>
-              </a:rPr>
-            </a:br>
-            <a:r>
-              <a:rPr lang="en-US" sz="800" b="1" dirty="0">
-                <a:latin typeface="Arial" charset="0"/>
-                <a:ea typeface="Arial" charset="0"/>
-                <a:cs typeface="Arial" charset="0"/>
-              </a:rPr>
-              <a:t>Cost Budget </a:t>
-            </a:r>
-            <a:r>
-              <a:rPr lang="en-US" sz="800" dirty="0">
-                <a:latin typeface="Arial" charset="0"/>
-                <a:ea typeface="Arial" charset="0"/>
-                <a:cs typeface="Arial" charset="0"/>
-              </a:rPr>
-              <a:t>= Mgt. Reserve + (</a:t>
-            </a:r>
-            <a:r>
-              <a:rPr lang="en-US" sz="800" b="1" dirty="0">
-                <a:latin typeface="Arial" charset="0"/>
-                <a:ea typeface="Arial" charset="0"/>
-                <a:cs typeface="Arial" charset="0"/>
-              </a:rPr>
-              <a:t>Cost Baseline</a:t>
-            </a:r>
-            <a:r>
-              <a:rPr lang="en-US" sz="800" dirty="0">
-                <a:latin typeface="Arial" charset="0"/>
-                <a:ea typeface="Arial" charset="0"/>
-                <a:cs typeface="Arial" charset="0"/>
-              </a:rPr>
-              <a:t> = Project Estimates + Contingency Reserve)</a:t>
-            </a:r>
-          </a:p>
-          <a:p>
-            <a:endParaRPr lang="en-US" sz="800" b="1" dirty="0" smtClean="0">
-              <a:latin typeface="Arial" charset="0"/>
-              <a:ea typeface="Arial" charset="0"/>
-              <a:cs typeface="Arial" charset="0"/>
-            </a:endParaRPr>
-          </a:p>
-          <a:p>
-            <a:r>
-              <a:rPr lang="en-US" sz="800" b="1" dirty="0" smtClean="0">
-                <a:latin typeface="Arial" charset="0"/>
-                <a:ea typeface="Arial" charset="0"/>
-                <a:cs typeface="Arial" charset="0"/>
-              </a:rPr>
-              <a:t>Ishikawa </a:t>
-            </a:r>
-            <a:r>
-              <a:rPr lang="en-US" sz="800" dirty="0">
-                <a:latin typeface="Arial" charset="0"/>
-                <a:ea typeface="Arial" charset="0"/>
-                <a:cs typeface="Arial" charset="0"/>
-              </a:rPr>
-              <a:t>= Fishbone Diagram: cause and effect. </a:t>
-            </a:r>
-          </a:p>
-          <a:p>
-            <a:r>
-              <a:rPr lang="en-US" sz="800" b="1" dirty="0">
-                <a:latin typeface="Arial" charset="0"/>
-                <a:ea typeface="Arial" charset="0"/>
-                <a:cs typeface="Arial" charset="0"/>
-              </a:rPr>
-              <a:t>Pareto Diagram: </a:t>
-            </a:r>
-            <a:r>
-              <a:rPr lang="en-US" sz="800" dirty="0">
-                <a:latin typeface="Arial" charset="0"/>
-                <a:ea typeface="Arial" charset="0"/>
-                <a:cs typeface="Arial" charset="0"/>
-              </a:rPr>
-              <a:t>Identify problems and frequency. 80/20 Rule. </a:t>
-            </a:r>
-          </a:p>
-          <a:p>
-            <a:r>
-              <a:rPr lang="en-US" sz="800" b="1" dirty="0">
-                <a:latin typeface="Arial" charset="0"/>
-                <a:ea typeface="Arial" charset="0"/>
-                <a:cs typeface="Arial" charset="0"/>
-              </a:rPr>
-              <a:t>Flow Charts; Control Charts</a:t>
-            </a:r>
-            <a:r>
-              <a:rPr lang="en-US" sz="800" dirty="0">
-                <a:latin typeface="Arial" charset="0"/>
-                <a:ea typeface="Arial" charset="0"/>
-                <a:cs typeface="Arial" charset="0"/>
-              </a:rPr>
-              <a:t>. </a:t>
-            </a:r>
-          </a:p>
-          <a:p>
-            <a:r>
-              <a:rPr lang="en-US" sz="800" b="1" dirty="0">
-                <a:latin typeface="Arial" charset="0"/>
-                <a:ea typeface="Arial" charset="0"/>
-                <a:cs typeface="Arial" charset="0"/>
-              </a:rPr>
-              <a:t>Just in Time: </a:t>
-            </a:r>
-            <a:r>
-              <a:rPr lang="en-US" sz="800" dirty="0">
-                <a:latin typeface="Arial" charset="0"/>
-                <a:ea typeface="Arial" charset="0"/>
-                <a:cs typeface="Arial" charset="0"/>
-              </a:rPr>
-              <a:t>Reduces inventory; requires additional quality control. </a:t>
-            </a:r>
-          </a:p>
-          <a:p>
-            <a:r>
-              <a:rPr lang="en-US" sz="800" b="1" dirty="0">
-                <a:latin typeface="Arial" charset="0"/>
-                <a:ea typeface="Arial" charset="0"/>
-                <a:cs typeface="Arial" charset="0"/>
-              </a:rPr>
-              <a:t>Quality Theories: </a:t>
-            </a:r>
-            <a:r>
-              <a:rPr lang="en-US" sz="800" dirty="0" smtClean="0">
-                <a:latin typeface="Arial" charset="0"/>
-                <a:ea typeface="Arial" charset="0"/>
-                <a:cs typeface="Arial" charset="0"/>
-              </a:rPr>
-              <a:t>Kaizen</a:t>
-            </a:r>
-            <a:r>
-              <a:rPr lang="en-US" sz="800" smtClean="0">
-                <a:latin typeface="Arial" charset="0"/>
-                <a:ea typeface="Arial" charset="0"/>
-                <a:cs typeface="Arial" charset="0"/>
-              </a:rPr>
-              <a:t>: continuous improvements, </a:t>
-            </a:r>
-            <a:r>
-              <a:rPr lang="en-US" sz="800" dirty="0">
-                <a:latin typeface="Arial" charset="0"/>
-                <a:ea typeface="Arial" charset="0"/>
-                <a:cs typeface="Arial" charset="0"/>
-              </a:rPr>
-              <a:t>Six Sigma</a:t>
-            </a:r>
-            <a:r>
-              <a:rPr lang="en-US" sz="800">
-                <a:latin typeface="Arial" charset="0"/>
-                <a:ea typeface="Arial" charset="0"/>
-                <a:cs typeface="Arial" charset="0"/>
-              </a:rPr>
-              <a:t>, </a:t>
-            </a:r>
-            <a:r>
-              <a:rPr lang="en-US" sz="800" smtClean="0">
-                <a:latin typeface="Arial" charset="0"/>
-                <a:ea typeface="Arial" charset="0"/>
-                <a:cs typeface="Arial" charset="0"/>
-              </a:rPr>
-              <a:t>TQM, </a:t>
-            </a:r>
-            <a:r>
-              <a:rPr lang="en-US" sz="800" b="1" smtClean="0">
-                <a:latin typeface="Arial" charset="0"/>
-                <a:ea typeface="Arial" charset="0"/>
-                <a:cs typeface="Arial" charset="0"/>
-              </a:rPr>
-              <a:t>Crosby</a:t>
-            </a:r>
-            <a:r>
-              <a:rPr lang="en-US" sz="800" dirty="0" smtClean="0">
-                <a:latin typeface="Arial" charset="0"/>
-                <a:ea typeface="Arial" charset="0"/>
-                <a:cs typeface="Arial" charset="0"/>
-              </a:rPr>
-              <a:t>: zero defects</a:t>
-            </a:r>
-          </a:p>
-          <a:p>
-            <a:r>
-              <a:rPr lang="en-US" sz="800" b="1" dirty="0" smtClean="0">
-                <a:latin typeface="Arial" charset="0"/>
-                <a:ea typeface="Arial" charset="0"/>
-                <a:cs typeface="Arial" charset="0"/>
-              </a:rPr>
-              <a:t>Variables Sampling</a:t>
-            </a:r>
-            <a:r>
-              <a:rPr lang="en-US" sz="800" dirty="0" smtClean="0">
-                <a:latin typeface="Arial" charset="0"/>
-                <a:ea typeface="Arial" charset="0"/>
-                <a:cs typeface="Arial" charset="0"/>
-              </a:rPr>
-              <a:t>: rated degree of conformity, </a:t>
-            </a:r>
-            <a:r>
-              <a:rPr lang="en-US" sz="800" b="1" dirty="0">
-                <a:latin typeface="Arial" charset="0"/>
-                <a:ea typeface="Arial" charset="0"/>
-                <a:cs typeface="Arial" charset="0"/>
-              </a:rPr>
-              <a:t>Attribute Sampling</a:t>
+              <a:rPr lang="en-US" sz="800" b="1" dirty="0">
+                <a:latin typeface="Arial" charset="0"/>
+                <a:ea typeface="Arial" charset="0"/>
+                <a:cs typeface="Arial" charset="0"/>
+              </a:rPr>
+              <a:t>Communication Theory:</a:t>
+            </a:r>
+            <a:r>
+              <a:rPr lang="en-US" sz="800" dirty="0">
+                <a:latin typeface="Arial" charset="0"/>
+                <a:ea typeface="Arial" charset="0"/>
+                <a:cs typeface="Arial" charset="0"/>
+              </a:rPr>
+              <a:t> Sender, Encoder, Medium, Noise, Decoder, Receiver; </a:t>
+            </a:r>
+          </a:p>
+          <a:p>
+            <a:r>
+              <a:rPr lang="en-US" sz="800" dirty="0">
+                <a:latin typeface="Arial" charset="0"/>
+                <a:ea typeface="Arial" charset="0"/>
+                <a:cs typeface="Arial" charset="0"/>
+              </a:rPr>
+              <a:t>Message sent; Information transferred. 55% nonverbal; </a:t>
+            </a:r>
+            <a:r>
+              <a:rPr lang="en-US" sz="800" b="1" dirty="0" err="1">
+                <a:latin typeface="Arial" charset="0"/>
+                <a:ea typeface="Arial" charset="0"/>
+                <a:cs typeface="Arial" charset="0"/>
+              </a:rPr>
+              <a:t>Paralingual</a:t>
+            </a:r>
+            <a:r>
+              <a:rPr lang="en-US" sz="800" dirty="0">
+                <a:latin typeface="Arial" charset="0"/>
+                <a:ea typeface="Arial" charset="0"/>
+                <a:cs typeface="Arial" charset="0"/>
+              </a:rPr>
+              <a:t>: pitch, tone, inflection; </a:t>
+            </a:r>
+          </a:p>
+          <a:p>
+            <a:r>
+              <a:rPr lang="en-US" sz="800" b="1" dirty="0">
+                <a:latin typeface="Arial" charset="0"/>
+                <a:ea typeface="Arial" charset="0"/>
+                <a:cs typeface="Arial" charset="0"/>
+              </a:rPr>
+              <a:t>Written</a:t>
             </a:r>
             <a:r>
               <a:rPr lang="en-US" sz="800" dirty="0">
@@ -4892,13 +5620,141 @@
               <a:t>: </a:t>
             </a:r>
             <a:r>
-              <a:rPr lang="en-US" sz="800" dirty="0" smtClean="0">
-                <a:latin typeface="Arial" charset="0"/>
-                <a:ea typeface="Arial" charset="0"/>
-                <a:cs typeface="Arial" charset="0"/>
-              </a:rPr>
-              <a:t>accepted or not</a:t>
-            </a:r>
+              <a:rPr lang="en-US" sz="800" b="1" dirty="0">
+                <a:latin typeface="Arial" charset="0"/>
+                <a:ea typeface="Arial" charset="0"/>
+                <a:cs typeface="Arial" charset="0"/>
+              </a:rPr>
+              <a:t>formal</a:t>
+            </a:r>
+            <a:r>
+              <a:rPr lang="en-US" sz="800" dirty="0">
+                <a:latin typeface="Arial" charset="0"/>
+                <a:ea typeface="Arial" charset="0"/>
+                <a:cs typeface="Arial" charset="0"/>
+              </a:rPr>
+              <a:t>: plan, contract, resource requests, </a:t>
+            </a:r>
+            <a:r>
+              <a:rPr lang="en-US" sz="800" b="1" dirty="0">
+                <a:latin typeface="Arial" charset="0"/>
+                <a:ea typeface="Arial" charset="0"/>
+                <a:cs typeface="Arial" charset="0"/>
+              </a:rPr>
+              <a:t>informal</a:t>
+            </a:r>
+            <a:r>
+              <a:rPr lang="en-US" sz="800" dirty="0">
+                <a:latin typeface="Arial" charset="0"/>
+                <a:ea typeface="Arial" charset="0"/>
+                <a:cs typeface="Arial" charset="0"/>
+              </a:rPr>
+              <a:t>: notes, memos, email</a:t>
+            </a:r>
+          </a:p>
+          <a:p>
+            <a:r>
+              <a:rPr lang="en-US" sz="800" b="1" dirty="0">
+                <a:latin typeface="Arial" charset="0"/>
+                <a:ea typeface="Arial" charset="0"/>
+                <a:cs typeface="Arial" charset="0"/>
+              </a:rPr>
+              <a:t>Verbal</a:t>
+            </a:r>
+            <a:r>
+              <a:rPr lang="en-US" sz="800" dirty="0">
+                <a:latin typeface="Arial" charset="0"/>
+                <a:ea typeface="Arial" charset="0"/>
+                <a:cs typeface="Arial" charset="0"/>
+              </a:rPr>
+              <a:t>: </a:t>
+            </a:r>
+            <a:r>
+              <a:rPr lang="en-US" sz="800" b="1" dirty="0">
+                <a:latin typeface="Arial" charset="0"/>
+                <a:ea typeface="Arial" charset="0"/>
+                <a:cs typeface="Arial" charset="0"/>
+              </a:rPr>
+              <a:t>formal</a:t>
+            </a:r>
+            <a:r>
+              <a:rPr lang="en-US" sz="800" dirty="0">
+                <a:latin typeface="Arial" charset="0"/>
+                <a:ea typeface="Arial" charset="0"/>
+                <a:cs typeface="Arial" charset="0"/>
+              </a:rPr>
+              <a:t>: presentation, bidder conf., </a:t>
+            </a:r>
+            <a:r>
+              <a:rPr lang="en-US" sz="800" b="1" dirty="0">
+                <a:latin typeface="Arial" charset="0"/>
+                <a:ea typeface="Arial" charset="0"/>
+                <a:cs typeface="Arial" charset="0"/>
+              </a:rPr>
+              <a:t>informal</a:t>
+            </a:r>
+            <a:r>
+              <a:rPr lang="en-US" sz="800" dirty="0">
+                <a:latin typeface="Arial" charset="0"/>
+                <a:ea typeface="Arial" charset="0"/>
+                <a:cs typeface="Arial" charset="0"/>
+              </a:rPr>
+              <a:t>: conversation, 1</a:t>
+            </a:r>
+            <a:r>
+              <a:rPr lang="en-US" sz="800" baseline="30000" dirty="0">
+                <a:latin typeface="Arial" charset="0"/>
+                <a:ea typeface="Arial" charset="0"/>
+                <a:cs typeface="Arial" charset="0"/>
+              </a:rPr>
+              <a:t>st</a:t>
+            </a:r>
+            <a:r>
+              <a:rPr lang="en-US" sz="800" dirty="0">
+                <a:latin typeface="Arial" charset="0"/>
+                <a:ea typeface="Arial" charset="0"/>
+                <a:cs typeface="Arial" charset="0"/>
+              </a:rPr>
+              <a:t> poor performance notice</a:t>
+            </a:r>
+          </a:p>
+          <a:p>
+            <a:r>
+              <a:rPr lang="en-US" sz="800" b="1" dirty="0">
+                <a:latin typeface="Arial" charset="0"/>
+                <a:ea typeface="Arial" charset="0"/>
+                <a:cs typeface="Arial" charset="0"/>
+              </a:rPr>
+              <a:t>Effective listening:</a:t>
+            </a:r>
+            <a:r>
+              <a:rPr lang="en-US" sz="800" dirty="0">
+                <a:latin typeface="Arial" charset="0"/>
+                <a:ea typeface="Arial" charset="0"/>
+                <a:cs typeface="Arial" charset="0"/>
+              </a:rPr>
+              <a:t> interpreting nonverbals, questions, feedback</a:t>
+            </a:r>
+          </a:p>
+          <a:p>
+            <a:r>
+              <a:rPr lang="en-US" sz="800" b="1" dirty="0">
+                <a:latin typeface="Arial" charset="0"/>
+                <a:ea typeface="Arial" charset="0"/>
+                <a:cs typeface="Arial" charset="0"/>
+              </a:rPr>
+              <a:t>Active listening: </a:t>
+            </a:r>
+            <a:r>
+              <a:rPr lang="en-US" sz="800" dirty="0">
+                <a:latin typeface="Arial" charset="0"/>
+                <a:ea typeface="Arial" charset="0"/>
+                <a:cs typeface="Arial" charset="0"/>
+              </a:rPr>
+              <a:t>participation with verbal + nonverbal signs of message receipt</a:t>
+            </a:r>
+          </a:p>
+          <a:p>
             <a:endParaRPr lang="en-US" sz="800" dirty="0">
               <a:latin typeface="Arial" charset="0"/>
               <a:ea typeface="Arial" charset="0"/>
@@ -4906,805 +5762,6 @@
             </a:endParaRPr>
           </a:p>
           <a:p>
-            <a:endParaRPr lang="en-US" sz="800" b="1" dirty="0" smtClean="0">
-              <a:latin typeface="Arial" charset="0"/>
-              <a:ea typeface="Arial" charset="0"/>
-              <a:cs typeface="Arial" charset="0"/>
-            </a:endParaRPr>
-          </a:p>
-          <a:p>
-            <a:r>
-              <a:rPr lang="en-US" sz="800" b="1" dirty="0" smtClean="0">
-                <a:latin typeface="Arial" charset="0"/>
-                <a:ea typeface="Arial" charset="0"/>
-                <a:cs typeface="Arial" charset="0"/>
-              </a:rPr>
-              <a:t>Maslow’s </a:t>
-            </a:r>
-            <a:r>
-              <a:rPr lang="en-US" sz="800" b="1" dirty="0">
-                <a:latin typeface="Arial" charset="0"/>
-                <a:ea typeface="Arial" charset="0"/>
-                <a:cs typeface="Arial" charset="0"/>
-              </a:rPr>
-              <a:t>Hierarchy of Needs: </a:t>
-            </a:r>
-            <a:r>
-              <a:rPr lang="en-US" sz="800" dirty="0">
-                <a:latin typeface="Arial" charset="0"/>
-                <a:ea typeface="Arial" charset="0"/>
-                <a:cs typeface="Arial" charset="0"/>
-              </a:rPr>
-              <a:t>Physiological, Safety, Social, Self -esteem, Self-actualization. </a:t>
-            </a:r>
-          </a:p>
-          <a:p>
-            <a:r>
-              <a:rPr lang="en-US" sz="800" b="1" dirty="0">
-                <a:latin typeface="Arial" charset="0"/>
-                <a:ea typeface="Arial" charset="0"/>
-                <a:cs typeface="Arial" charset="0"/>
-              </a:rPr>
-              <a:t>McClelland’s Theory of Needs:</a:t>
-            </a:r>
-            <a:r>
-              <a:rPr lang="en-US" sz="800" dirty="0">
-                <a:latin typeface="Arial" charset="0"/>
-                <a:ea typeface="Arial" charset="0"/>
-                <a:cs typeface="Arial" charset="0"/>
-              </a:rPr>
-              <a:t> over time, achievement, affiliation, power, Apperception test</a:t>
-            </a:r>
-          </a:p>
-          <a:p>
-            <a:r>
-              <a:rPr lang="en-US" sz="800" b="1" dirty="0">
-                <a:latin typeface="Arial" charset="0"/>
-                <a:ea typeface="Arial" charset="0"/>
-                <a:cs typeface="Arial" charset="0"/>
-              </a:rPr>
-              <a:t>McGregor’s X &amp; Y: </a:t>
-            </a:r>
-            <a:r>
-              <a:rPr lang="en-US" sz="800" dirty="0">
-                <a:latin typeface="Arial" charset="0"/>
-                <a:ea typeface="Arial" charset="0"/>
-                <a:cs typeface="Arial" charset="0"/>
-              </a:rPr>
-              <a:t>X: bad, lazy-&gt; micromanagement; Y: self-directed</a:t>
-            </a:r>
-            <a:br>
-              <a:rPr lang="en-US" sz="800" dirty="0">
-                <a:latin typeface="Arial" charset="0"/>
-                <a:ea typeface="Arial" charset="0"/>
-                <a:cs typeface="Arial" charset="0"/>
-              </a:rPr>
-            </a:br>
-            <a:r>
-              <a:rPr lang="en-US" sz="800" b="1" dirty="0" err="1">
-                <a:latin typeface="Arial" charset="0"/>
-                <a:ea typeface="Arial" charset="0"/>
-                <a:cs typeface="Arial" charset="0"/>
-              </a:rPr>
-              <a:t>Ouchi’s</a:t>
-            </a:r>
-            <a:r>
-              <a:rPr lang="en-US" sz="800" b="1" dirty="0">
-                <a:latin typeface="Arial" charset="0"/>
-                <a:ea typeface="Arial" charset="0"/>
-                <a:cs typeface="Arial" charset="0"/>
-              </a:rPr>
-              <a:t> Theo. Z:</a:t>
-            </a:r>
-            <a:r>
-              <a:rPr lang="en-US" sz="800" dirty="0">
-                <a:latin typeface="Arial" charset="0"/>
-                <a:ea typeface="Arial" charset="0"/>
-                <a:cs typeface="Arial" charset="0"/>
-              </a:rPr>
-              <a:t> People are X + Y, motivated by commitment, opportunity advancement. </a:t>
-            </a:r>
-          </a:p>
-          <a:p>
-            <a:r>
-              <a:rPr lang="en-US" sz="800" b="1" dirty="0">
-                <a:latin typeface="Arial" charset="0"/>
-                <a:ea typeface="Arial" charset="0"/>
-                <a:cs typeface="Arial" charset="0"/>
-              </a:rPr>
-              <a:t>Herzberg’s Theory of Motivation: </a:t>
-            </a:r>
-            <a:r>
-              <a:rPr lang="en-US" sz="800" dirty="0">
-                <a:latin typeface="Arial" charset="0"/>
-                <a:ea typeface="Arial" charset="0"/>
-                <a:cs typeface="Arial" charset="0"/>
-              </a:rPr>
-              <a:t>Hygiene factors, Motivating Agents. </a:t>
-            </a:r>
-          </a:p>
-          <a:p>
-            <a:r>
-              <a:rPr lang="en-US" sz="800" b="1" dirty="0">
-                <a:latin typeface="Arial" charset="0"/>
-                <a:ea typeface="Arial" charset="0"/>
-                <a:cs typeface="Arial" charset="0"/>
-              </a:rPr>
-              <a:t>Vroom’s Expectancy Theory:</a:t>
-            </a:r>
-            <a:r>
-              <a:rPr lang="en-US" sz="800" dirty="0">
-                <a:latin typeface="Arial" charset="0"/>
-                <a:ea typeface="Arial" charset="0"/>
-                <a:cs typeface="Arial" charset="0"/>
-              </a:rPr>
-              <a:t> People behave based on their belief on what will be the result.</a:t>
-            </a:r>
-          </a:p>
-          <a:p>
-            <a:r>
-              <a:rPr lang="en-US" sz="800" b="1" dirty="0">
-                <a:latin typeface="Arial" charset="0"/>
-                <a:ea typeface="Arial" charset="0"/>
-                <a:cs typeface="Arial" charset="0"/>
-              </a:rPr>
-              <a:t>Halo Effect:</a:t>
-            </a:r>
-            <a:r>
-              <a:rPr lang="en-US" sz="800" dirty="0">
-                <a:latin typeface="Arial" charset="0"/>
-                <a:ea typeface="Arial" charset="0"/>
-                <a:cs typeface="Arial" charset="0"/>
-              </a:rPr>
-              <a:t> all opinions formed by one component, good engineer must be a good manager.</a:t>
-            </a:r>
-          </a:p>
-          <a:p>
-            <a:r>
-              <a:rPr lang="en-US" sz="800" b="1" dirty="0">
-                <a:latin typeface="Arial" charset="0"/>
-                <a:ea typeface="Arial" charset="0"/>
-                <a:cs typeface="Arial" charset="0"/>
-              </a:rPr>
-              <a:t>Leadership: </a:t>
-            </a:r>
-            <a:r>
-              <a:rPr lang="en-US" sz="800" dirty="0">
-                <a:latin typeface="Arial" charset="0"/>
-                <a:ea typeface="Arial" charset="0"/>
-                <a:cs typeface="Arial" charset="0"/>
-              </a:rPr>
-              <a:t>Directing, Facilitating, Coaching, Supporting, Autocratic, Consultative, Consensus.</a:t>
-            </a:r>
-          </a:p>
-          <a:p>
-            <a:r>
-              <a:rPr lang="en-US" sz="800" b="1" dirty="0">
-                <a:latin typeface="Arial" charset="0"/>
-                <a:ea typeface="Arial" charset="0"/>
-                <a:cs typeface="Arial" charset="0"/>
-              </a:rPr>
-              <a:t>Team Roles: </a:t>
-            </a:r>
-            <a:r>
-              <a:rPr lang="en-US" sz="700" dirty="0">
-                <a:latin typeface="Arial" charset="0"/>
-                <a:ea typeface="Arial" charset="0"/>
-                <a:cs typeface="Arial" charset="0"/>
-              </a:rPr>
-              <a:t>Initiator, </a:t>
-            </a:r>
-            <a:r>
-              <a:rPr lang="en-US" sz="700" dirty="0" err="1" smtClean="0">
-                <a:latin typeface="Arial" charset="0"/>
-                <a:ea typeface="Arial" charset="0"/>
-                <a:cs typeface="Arial" charset="0"/>
-              </a:rPr>
-              <a:t>Inf.Seeker</a:t>
-            </a:r>
-            <a:r>
-              <a:rPr lang="en-US" sz="700" dirty="0">
-                <a:latin typeface="Arial" charset="0"/>
-                <a:ea typeface="Arial" charset="0"/>
-                <a:cs typeface="Arial" charset="0"/>
-              </a:rPr>
-              <a:t>, </a:t>
-            </a:r>
-            <a:r>
-              <a:rPr lang="en-US" sz="700" dirty="0" err="1" smtClean="0">
-                <a:latin typeface="Arial" charset="0"/>
-                <a:ea typeface="Arial" charset="0"/>
-                <a:cs typeface="Arial" charset="0"/>
-              </a:rPr>
-              <a:t>Inf.Giver</a:t>
-            </a:r>
-            <a:r>
-              <a:rPr lang="en-US" sz="700" dirty="0">
-                <a:latin typeface="Arial" charset="0"/>
-                <a:ea typeface="Arial" charset="0"/>
-                <a:cs typeface="Arial" charset="0"/>
-              </a:rPr>
-              <a:t>, Encourager, </a:t>
-            </a:r>
-            <a:r>
-              <a:rPr lang="en-US" sz="700" dirty="0" smtClean="0">
-                <a:latin typeface="Arial" charset="0"/>
-                <a:ea typeface="Arial" charset="0"/>
-                <a:cs typeface="Arial" charset="0"/>
-              </a:rPr>
-              <a:t>Clarifier, Gate </a:t>
-            </a:r>
-            <a:r>
-              <a:rPr lang="en-US" sz="700" dirty="0">
-                <a:latin typeface="Arial" charset="0"/>
-                <a:ea typeface="Arial" charset="0"/>
-                <a:cs typeface="Arial" charset="0"/>
-              </a:rPr>
-              <a:t>Keeper, Harmonizer, Summarizer</a:t>
-            </a:r>
-            <a:r>
-              <a:rPr lang="en-US" sz="800" dirty="0">
-                <a:latin typeface="Arial" charset="0"/>
-                <a:ea typeface="Arial" charset="0"/>
-                <a:cs typeface="Arial" charset="0"/>
-              </a:rPr>
-              <a:t/>
-            </a:r>
-            <a:br>
-              <a:rPr lang="en-US" sz="800" dirty="0">
-                <a:latin typeface="Arial" charset="0"/>
-                <a:ea typeface="Arial" charset="0"/>
-                <a:cs typeface="Arial" charset="0"/>
-              </a:rPr>
-            </a:br>
-            <a:r>
-              <a:rPr lang="en-US" sz="800" b="1" dirty="0" smtClean="0">
-                <a:latin typeface="Arial" charset="0"/>
-                <a:ea typeface="Arial" charset="0"/>
-                <a:cs typeface="Arial" charset="0"/>
-              </a:rPr>
-              <a:t>Manager </a:t>
-            </a:r>
-            <a:r>
-              <a:rPr lang="en-US" sz="800" b="1" dirty="0">
-                <a:latin typeface="Arial" charset="0"/>
-                <a:ea typeface="Arial" charset="0"/>
-                <a:cs typeface="Arial" charset="0"/>
-              </a:rPr>
-              <a:t>Powers: </a:t>
-            </a:r>
-            <a:r>
-              <a:rPr lang="en-US" sz="800" dirty="0">
-                <a:latin typeface="Arial" charset="0"/>
-                <a:ea typeface="Arial" charset="0"/>
-                <a:cs typeface="Arial" charset="0"/>
-              </a:rPr>
-              <a:t>Formal (legitimate,) Reward, Penalty (coercive), Expert, Referent. </a:t>
-            </a:r>
-          </a:p>
-          <a:p>
-            <a:r>
-              <a:rPr lang="en-US" sz="800" b="1" dirty="0">
-                <a:latin typeface="Arial" charset="0"/>
-                <a:ea typeface="Arial" charset="0"/>
-                <a:cs typeface="Arial" charset="0"/>
-              </a:rPr>
-              <a:t>Conflict Management: win-win: </a:t>
-            </a:r>
-            <a:r>
-              <a:rPr lang="en-US" sz="800" dirty="0">
-                <a:latin typeface="Arial" charset="0"/>
-                <a:ea typeface="Arial" charset="0"/>
-                <a:cs typeface="Arial" charset="0"/>
-              </a:rPr>
-              <a:t>Confront (problem solving.), Collaborate; </a:t>
-            </a:r>
-            <a:r>
-              <a:rPr lang="en-US" sz="800" b="1" dirty="0">
-                <a:latin typeface="Arial" charset="0"/>
-                <a:ea typeface="Arial" charset="0"/>
-                <a:cs typeface="Arial" charset="0"/>
-              </a:rPr>
-              <a:t>win-lose:</a:t>
-            </a:r>
-            <a:r>
-              <a:rPr lang="en-US" sz="800" dirty="0">
-                <a:latin typeface="Arial" charset="0"/>
-                <a:ea typeface="Arial" charset="0"/>
-                <a:cs typeface="Arial" charset="0"/>
-              </a:rPr>
-              <a:t> Force</a:t>
-            </a:r>
-          </a:p>
-          <a:p>
-            <a:r>
-              <a:rPr lang="en-US" sz="800" b="1" dirty="0">
-                <a:latin typeface="Arial" charset="0"/>
-                <a:ea typeface="Arial" charset="0"/>
-                <a:cs typeface="Arial" charset="0"/>
-              </a:rPr>
-              <a:t>yield-lose:</a:t>
-            </a:r>
-            <a:r>
-              <a:rPr lang="en-US" sz="800" dirty="0">
-                <a:latin typeface="Arial" charset="0"/>
-                <a:ea typeface="Arial" charset="0"/>
-                <a:cs typeface="Arial" charset="0"/>
-              </a:rPr>
-              <a:t> Withdraw (avoid); </a:t>
-            </a:r>
-            <a:r>
-              <a:rPr lang="en-US" sz="800" b="1" dirty="0">
-                <a:latin typeface="Arial" charset="0"/>
-                <a:ea typeface="Arial" charset="0"/>
-                <a:cs typeface="Arial" charset="0"/>
-              </a:rPr>
-              <a:t>lose-lose:</a:t>
-            </a:r>
-            <a:r>
-              <a:rPr lang="en-US" sz="800" dirty="0">
-                <a:latin typeface="Arial" charset="0"/>
-                <a:ea typeface="Arial" charset="0"/>
-                <a:cs typeface="Arial" charset="0"/>
-              </a:rPr>
-              <a:t> Smooth (accommodate), Compromise</a:t>
-            </a:r>
-          </a:p>
-          <a:p>
-            <a:endParaRPr lang="en-US" sz="800" b="1" dirty="0" smtClean="0">
-              <a:latin typeface="Arial" charset="0"/>
-              <a:ea typeface="Arial" charset="0"/>
-              <a:cs typeface="Arial" charset="0"/>
-            </a:endParaRPr>
-          </a:p>
-          <a:p>
-            <a:r>
-              <a:rPr lang="en-US" sz="800" b="1" dirty="0" smtClean="0">
-                <a:latin typeface="Arial" charset="0"/>
-                <a:ea typeface="Arial" charset="0"/>
-                <a:cs typeface="Arial" charset="0"/>
-              </a:rPr>
-              <a:t>Risk </a:t>
-            </a:r>
-            <a:r>
-              <a:rPr lang="en-US" sz="800" b="1" dirty="0">
-                <a:latin typeface="Arial" charset="0"/>
-                <a:ea typeface="Arial" charset="0"/>
-                <a:cs typeface="Arial" charset="0"/>
-              </a:rPr>
-              <a:t>Mgt. Strategies: </a:t>
-            </a:r>
-            <a:r>
-              <a:rPr lang="en-US" sz="800" dirty="0">
-                <a:latin typeface="Arial" charset="0"/>
-                <a:ea typeface="Arial" charset="0"/>
-                <a:cs typeface="Arial" charset="0"/>
-              </a:rPr>
-              <a:t>Avoid, Transfer, Mitigate, Accept, Exploit, Share, Enhance, Accept. </a:t>
-            </a:r>
-          </a:p>
-          <a:p>
-            <a:r>
-              <a:rPr lang="en-US" sz="800" b="1" dirty="0">
-                <a:latin typeface="Arial" charset="0"/>
-                <a:ea typeface="Arial" charset="0"/>
-                <a:cs typeface="Arial" charset="0"/>
-              </a:rPr>
-              <a:t>Qualitative Risk Analysis: </a:t>
-            </a:r>
-            <a:r>
-              <a:rPr lang="en-US" sz="800" dirty="0">
-                <a:latin typeface="Arial" charset="0"/>
-                <a:ea typeface="Arial" charset="0"/>
-                <a:cs typeface="Arial" charset="0"/>
-              </a:rPr>
-              <a:t>Chance and impact of occurrence, prioritized list; ranking.</a:t>
-            </a:r>
-            <a:br>
-              <a:rPr lang="en-US" sz="800" dirty="0">
-                <a:latin typeface="Arial" charset="0"/>
-                <a:ea typeface="Arial" charset="0"/>
-                <a:cs typeface="Arial" charset="0"/>
-              </a:rPr>
-            </a:br>
-            <a:r>
-              <a:rPr lang="en-US" sz="800" b="1" dirty="0">
-                <a:latin typeface="Arial" charset="0"/>
-                <a:ea typeface="Arial" charset="0"/>
-                <a:cs typeface="Arial" charset="0"/>
-              </a:rPr>
-              <a:t>Quantitative Risk Analysis: </a:t>
-            </a:r>
-            <a:r>
-              <a:rPr lang="en-US" sz="800" dirty="0">
-                <a:latin typeface="Arial" charset="0"/>
-                <a:ea typeface="Arial" charset="0"/>
-                <a:cs typeface="Arial" charset="0"/>
-              </a:rPr>
-              <a:t>Numerical analysis of probability and impact.</a:t>
-            </a:r>
-          </a:p>
-          <a:p>
-            <a:r>
-              <a:rPr lang="en-US" sz="800" b="1" dirty="0">
-                <a:latin typeface="Arial" charset="0"/>
-                <a:ea typeface="Arial" charset="0"/>
-                <a:cs typeface="Arial" charset="0"/>
-              </a:rPr>
-              <a:t>Tools: </a:t>
-            </a:r>
-            <a:r>
-              <a:rPr lang="en-US" sz="800" dirty="0">
-                <a:latin typeface="Arial" charset="0"/>
-                <a:ea typeface="Arial" charset="0"/>
-                <a:cs typeface="Arial" charset="0"/>
-              </a:rPr>
-              <a:t>Interviews, Sensitivity Analysis, Decision Tree Analysis, Simulation, Monte Carlo.</a:t>
-            </a:r>
-          </a:p>
-          <a:p>
-            <a:r>
-              <a:rPr lang="en-US" sz="800" b="1" dirty="0">
-                <a:latin typeface="Arial" charset="0"/>
-                <a:ea typeface="Arial" charset="0"/>
-                <a:cs typeface="Arial" charset="0"/>
-              </a:rPr>
-              <a:t>Expected Monetary Value = </a:t>
-            </a:r>
-            <a:r>
-              <a:rPr lang="en-US" sz="800" dirty="0">
-                <a:latin typeface="Arial" charset="0"/>
-                <a:ea typeface="Arial" charset="0"/>
-                <a:cs typeface="Arial" charset="0"/>
-              </a:rPr>
-              <a:t>probability * impact; </a:t>
-            </a:r>
-            <a:r>
-              <a:rPr lang="en-US" sz="800" b="1" dirty="0">
-                <a:latin typeface="Arial" charset="0"/>
-                <a:ea typeface="Arial" charset="0"/>
-                <a:cs typeface="Arial" charset="0"/>
-              </a:rPr>
-              <a:t>Contingency Reserve</a:t>
-            </a:r>
-            <a:r>
-              <a:rPr lang="en-US" sz="800" dirty="0">
-                <a:latin typeface="Arial" charset="0"/>
-                <a:ea typeface="Arial" charset="0"/>
-                <a:cs typeface="Arial" charset="0"/>
-              </a:rPr>
-              <a:t> = 𝛴( p * </a:t>
-            </a:r>
-            <a:r>
-              <a:rPr lang="en-US" sz="800" dirty="0" err="1">
-                <a:latin typeface="Arial" charset="0"/>
-                <a:ea typeface="Arial" charset="0"/>
-                <a:cs typeface="Arial" charset="0"/>
-              </a:rPr>
-              <a:t>i</a:t>
-            </a:r>
-            <a:r>
-              <a:rPr lang="en-US" sz="800" dirty="0">
-                <a:latin typeface="Arial" charset="0"/>
-                <a:ea typeface="Arial" charset="0"/>
-                <a:cs typeface="Arial" charset="0"/>
-              </a:rPr>
-              <a:t> )</a:t>
-            </a:r>
-          </a:p>
-          <a:p>
-            <a:r>
-              <a:rPr lang="en-US" sz="800" b="1" dirty="0">
-                <a:latin typeface="Arial" charset="0"/>
-                <a:ea typeface="Arial" charset="0"/>
-                <a:cs typeface="Arial" charset="0"/>
-              </a:rPr>
-              <a:t>Risks: Pure:</a:t>
-            </a:r>
-            <a:r>
-              <a:rPr lang="en-US" sz="800" dirty="0">
-                <a:latin typeface="Arial" charset="0"/>
-                <a:ea typeface="Arial" charset="0"/>
-                <a:cs typeface="Arial" charset="0"/>
-              </a:rPr>
-              <a:t> negative impact only, injury, theft, fire, destruction</a:t>
-            </a:r>
-          </a:p>
-          <a:p>
-            <a:r>
-              <a:rPr lang="en-US" sz="800" b="1" dirty="0">
-                <a:latin typeface="Arial" charset="0"/>
-                <a:ea typeface="Arial" charset="0"/>
-                <a:cs typeface="Arial" charset="0"/>
-              </a:rPr>
-              <a:t>Secondary:</a:t>
-            </a:r>
-            <a:r>
-              <a:rPr lang="en-US" sz="800" dirty="0">
-                <a:latin typeface="Arial" charset="0"/>
-                <a:ea typeface="Arial" charset="0"/>
-                <a:cs typeface="Arial" charset="0"/>
-              </a:rPr>
-              <a:t> risk response creates another risk; </a:t>
-            </a:r>
-            <a:r>
-              <a:rPr lang="en-US" sz="800" b="1" dirty="0">
-                <a:latin typeface="Arial" charset="0"/>
-                <a:ea typeface="Arial" charset="0"/>
-                <a:cs typeface="Arial" charset="0"/>
-              </a:rPr>
-              <a:t>Residual:</a:t>
-            </a:r>
-            <a:r>
-              <a:rPr lang="en-US" sz="800" dirty="0">
-                <a:latin typeface="Arial" charset="0"/>
-                <a:ea typeface="Arial" charset="0"/>
-                <a:cs typeface="Arial" charset="0"/>
-              </a:rPr>
-              <a:t> small generally accepted risk</a:t>
-            </a:r>
-          </a:p>
-          <a:p>
-            <a:r>
-              <a:rPr lang="en-US" sz="800" b="1" dirty="0">
-                <a:latin typeface="Arial" charset="0"/>
-                <a:ea typeface="Arial" charset="0"/>
-                <a:cs typeface="Arial" charset="0"/>
-              </a:rPr>
-              <a:t>Utility Function = Risk Tolerance:</a:t>
-            </a:r>
-            <a:r>
-              <a:rPr lang="en-US" sz="800" dirty="0">
-                <a:latin typeface="Arial" charset="0"/>
-                <a:ea typeface="Arial" charset="0"/>
-                <a:cs typeface="Arial" charset="0"/>
-              </a:rPr>
-              <a:t> willingness to accept risk</a:t>
-            </a:r>
-          </a:p>
-          <a:p>
-            <a:endParaRPr lang="en-US" sz="800" dirty="0" smtClean="0">
-              <a:latin typeface="Arial" charset="0"/>
-              <a:ea typeface="Arial" charset="0"/>
-              <a:cs typeface="Arial" charset="0"/>
-            </a:endParaRPr>
-          </a:p>
-          <a:p>
-            <a:r>
-              <a:rPr lang="en-US" sz="800" dirty="0" smtClean="0">
-                <a:latin typeface="Arial" charset="0"/>
-                <a:ea typeface="Arial" charset="0"/>
-                <a:cs typeface="Arial" charset="0"/>
-              </a:rPr>
-              <a:t>Sender</a:t>
-            </a:r>
-            <a:r>
-              <a:rPr lang="en-US" sz="800" dirty="0">
-                <a:latin typeface="Arial" charset="0"/>
-                <a:ea typeface="Arial" charset="0"/>
-                <a:cs typeface="Arial" charset="0"/>
-              </a:rPr>
-              <a:t>, Encoder, Medium, Noise, Decoder, Receiver; </a:t>
-            </a:r>
-            <a:r>
-              <a:rPr lang="en-US" sz="800" dirty="0" smtClean="0">
-                <a:latin typeface="Arial" charset="0"/>
-                <a:ea typeface="Arial" charset="0"/>
-                <a:cs typeface="Arial" charset="0"/>
-              </a:rPr>
-              <a:t>Message </a:t>
-            </a:r>
-            <a:r>
-              <a:rPr lang="en-US" sz="800" dirty="0">
-                <a:latin typeface="Arial" charset="0"/>
-                <a:ea typeface="Arial" charset="0"/>
-                <a:cs typeface="Arial" charset="0"/>
-              </a:rPr>
-              <a:t>sent; Info transferred.</a:t>
-            </a:r>
-          </a:p>
-          <a:p>
-            <a:r>
-              <a:rPr lang="en-US" sz="800" dirty="0">
-                <a:latin typeface="Arial" charset="0"/>
-                <a:ea typeface="Arial" charset="0"/>
-                <a:cs typeface="Arial" charset="0"/>
-              </a:rPr>
-              <a:t>55% nonverbal; </a:t>
-            </a:r>
-            <a:r>
-              <a:rPr lang="en-US" sz="800" b="1" dirty="0" err="1">
-                <a:latin typeface="Arial" charset="0"/>
-                <a:ea typeface="Arial" charset="0"/>
-                <a:cs typeface="Arial" charset="0"/>
-              </a:rPr>
-              <a:t>Paralingual</a:t>
-            </a:r>
-            <a:r>
-              <a:rPr lang="en-US" sz="800" dirty="0">
-                <a:latin typeface="Arial" charset="0"/>
-                <a:ea typeface="Arial" charset="0"/>
-                <a:cs typeface="Arial" charset="0"/>
-              </a:rPr>
-              <a:t>: pitch, tone, inflection</a:t>
-            </a:r>
-          </a:p>
-          <a:p>
-            <a:r>
-              <a:rPr lang="en-US" sz="800" b="1" dirty="0">
-                <a:latin typeface="Arial" charset="0"/>
-                <a:ea typeface="Arial" charset="0"/>
-                <a:cs typeface="Arial" charset="0"/>
-              </a:rPr>
-              <a:t>Written</a:t>
-            </a:r>
-            <a:r>
-              <a:rPr lang="en-US" sz="800" dirty="0">
-                <a:latin typeface="Arial" charset="0"/>
-                <a:ea typeface="Arial" charset="0"/>
-                <a:cs typeface="Arial" charset="0"/>
-              </a:rPr>
-              <a:t>: </a:t>
-            </a:r>
-            <a:r>
-              <a:rPr lang="en-US" sz="800" b="1" dirty="0">
-                <a:latin typeface="Arial" charset="0"/>
-                <a:ea typeface="Arial" charset="0"/>
-                <a:cs typeface="Arial" charset="0"/>
-              </a:rPr>
-              <a:t>form</a:t>
-            </a:r>
-            <a:r>
-              <a:rPr lang="en-US" sz="800" dirty="0">
-                <a:latin typeface="Arial" charset="0"/>
-                <a:ea typeface="Arial" charset="0"/>
-                <a:cs typeface="Arial" charset="0"/>
-              </a:rPr>
-              <a:t>: plan, contract, resource requests, </a:t>
-            </a:r>
-            <a:r>
-              <a:rPr lang="en-US" sz="800" b="1" dirty="0">
-                <a:latin typeface="Arial" charset="0"/>
-                <a:ea typeface="Arial" charset="0"/>
-                <a:cs typeface="Arial" charset="0"/>
-              </a:rPr>
-              <a:t>inform</a:t>
-            </a:r>
-            <a:r>
-              <a:rPr lang="en-US" sz="800" dirty="0">
-                <a:latin typeface="Arial" charset="0"/>
-                <a:ea typeface="Arial" charset="0"/>
-                <a:cs typeface="Arial" charset="0"/>
-              </a:rPr>
-              <a:t>: notes, memos, email</a:t>
-            </a:r>
-          </a:p>
-          <a:p>
-            <a:r>
-              <a:rPr lang="en-US" sz="800" b="1" dirty="0">
-                <a:latin typeface="Arial" charset="0"/>
-                <a:ea typeface="Arial" charset="0"/>
-                <a:cs typeface="Arial" charset="0"/>
-              </a:rPr>
-              <a:t>Verbal</a:t>
-            </a:r>
-            <a:r>
-              <a:rPr lang="en-US" sz="800" dirty="0">
-                <a:latin typeface="Arial" charset="0"/>
-                <a:ea typeface="Arial" charset="0"/>
-                <a:cs typeface="Arial" charset="0"/>
-              </a:rPr>
-              <a:t>: </a:t>
-            </a:r>
-            <a:r>
-              <a:rPr lang="en-US" sz="800" b="1" dirty="0">
-                <a:latin typeface="Arial" charset="0"/>
-                <a:ea typeface="Arial" charset="0"/>
-                <a:cs typeface="Arial" charset="0"/>
-              </a:rPr>
-              <a:t>form</a:t>
-            </a:r>
-            <a:r>
-              <a:rPr lang="en-US" sz="800" dirty="0">
-                <a:latin typeface="Arial" charset="0"/>
-                <a:ea typeface="Arial" charset="0"/>
-                <a:cs typeface="Arial" charset="0"/>
-              </a:rPr>
-              <a:t>: presentation, bidder conf., </a:t>
-            </a:r>
-            <a:r>
-              <a:rPr lang="en-US" sz="800" b="1" dirty="0">
-                <a:latin typeface="Arial" charset="0"/>
-                <a:ea typeface="Arial" charset="0"/>
-                <a:cs typeface="Arial" charset="0"/>
-              </a:rPr>
-              <a:t>inform</a:t>
-            </a:r>
-            <a:r>
-              <a:rPr lang="en-US" sz="800" dirty="0">
-                <a:latin typeface="Arial" charset="0"/>
-                <a:ea typeface="Arial" charset="0"/>
-                <a:cs typeface="Arial" charset="0"/>
-              </a:rPr>
-              <a:t>: conversation, 1</a:t>
-            </a:r>
-            <a:r>
-              <a:rPr lang="en-US" sz="800" baseline="30000" dirty="0">
-                <a:latin typeface="Arial" charset="0"/>
-                <a:ea typeface="Arial" charset="0"/>
-                <a:cs typeface="Arial" charset="0"/>
-              </a:rPr>
-              <a:t>st</a:t>
-            </a:r>
-            <a:r>
-              <a:rPr lang="en-US" sz="800" dirty="0">
-                <a:latin typeface="Arial" charset="0"/>
-                <a:ea typeface="Arial" charset="0"/>
-                <a:cs typeface="Arial" charset="0"/>
-              </a:rPr>
-              <a:t> poor performance notice</a:t>
-            </a:r>
-          </a:p>
-          <a:p>
-            <a:r>
-              <a:rPr lang="en-US" sz="800" b="1" dirty="0">
-                <a:latin typeface="Arial" charset="0"/>
-                <a:ea typeface="Arial" charset="0"/>
-                <a:cs typeface="Arial" charset="0"/>
-              </a:rPr>
-              <a:t>Effective listening:</a:t>
-            </a:r>
-            <a:r>
-              <a:rPr lang="en-US" sz="800" dirty="0">
-                <a:latin typeface="Arial" charset="0"/>
-                <a:ea typeface="Arial" charset="0"/>
-                <a:cs typeface="Arial" charset="0"/>
-              </a:rPr>
-              <a:t> interpreting </a:t>
-            </a:r>
-            <a:r>
-              <a:rPr lang="en-US" sz="800" dirty="0" err="1">
-                <a:latin typeface="Arial" charset="0"/>
-                <a:ea typeface="Arial" charset="0"/>
-                <a:cs typeface="Arial" charset="0"/>
-              </a:rPr>
-              <a:t>nonverbals</a:t>
-            </a:r>
-            <a:r>
-              <a:rPr lang="en-US" sz="800" dirty="0">
-                <a:latin typeface="Arial" charset="0"/>
-                <a:ea typeface="Arial" charset="0"/>
-                <a:cs typeface="Arial" charset="0"/>
-              </a:rPr>
-              <a:t>, questions, feedback</a:t>
-            </a:r>
-          </a:p>
-          <a:p>
-            <a:r>
-              <a:rPr lang="en-US" sz="800" b="1" dirty="0">
-                <a:latin typeface="Arial" charset="0"/>
-                <a:ea typeface="Arial" charset="0"/>
-                <a:cs typeface="Arial" charset="0"/>
-              </a:rPr>
-              <a:t>Active listening: </a:t>
-            </a:r>
-            <a:r>
-              <a:rPr lang="en-US" sz="800" dirty="0">
-                <a:latin typeface="Arial" charset="0"/>
-                <a:ea typeface="Arial" charset="0"/>
-                <a:cs typeface="Arial" charset="0"/>
-              </a:rPr>
-              <a:t>participation with verbal + nonverbal signs of message receipt</a:t>
-            </a:r>
-          </a:p>
-          <a:p>
-            <a:endParaRPr lang="en-US" sz="800" dirty="0" smtClean="0">
-              <a:latin typeface="Arial" charset="0"/>
-              <a:ea typeface="Arial" charset="0"/>
-              <a:cs typeface="Arial" charset="0"/>
-            </a:endParaRPr>
-          </a:p>
-          <a:p>
             <a:r>
               <a:rPr lang="en-US" sz="800" b="1" dirty="0">
                 <a:latin typeface="Arial" charset="0"/>
@@ -5719,7 +5776,7 @@
                 <a:ea typeface="Arial" charset="0"/>
                 <a:cs typeface="Arial" charset="0"/>
               </a:rPr>
-              <a:t> Cost + award/incentive/fixed Fee, </a:t>
+              <a:t> Cost + Fee(award/incentive/fixed), </a:t>
             </a:r>
             <a:r>
               <a:rPr lang="en-US" sz="800" b="1" dirty="0">
@@ -5865,42 +5922,21 @@
           </a:p>
           <a:p>
             <a:r>
-              <a:rPr lang="en-US" sz="800" b="1" dirty="0" smtClean="0">
-                <a:latin typeface="Arial" charset="0"/>
-                <a:ea typeface="Arial" charset="0"/>
-                <a:cs typeface="Arial" charset="0"/>
-              </a:rPr>
-              <a:t>Stakeholder </a:t>
-            </a:r>
-            <a:r>
-              <a:rPr lang="en-US" sz="800" b="1" dirty="0">
-                <a:latin typeface="Arial" charset="0"/>
-                <a:ea typeface="Arial" charset="0"/>
-                <a:cs typeface="Arial" charset="0"/>
-              </a:rPr>
-              <a:t>classification:</a:t>
-            </a:r>
-            <a:r>
-              <a:rPr lang="en-US" sz="800" dirty="0">
-                <a:latin typeface="Arial" charset="0"/>
-                <a:ea typeface="Arial" charset="0"/>
-                <a:cs typeface="Arial" charset="0"/>
-              </a:rPr>
-              <a:t> </a:t>
-            </a:r>
-            <a:r>
-              <a:rPr lang="en-US" sz="800" dirty="0" smtClean="0">
-                <a:latin typeface="Arial" charset="0"/>
-                <a:ea typeface="Arial" charset="0"/>
-                <a:cs typeface="Arial" charset="0"/>
-              </a:rPr>
-              <a:t>Power-Interest/Influence, Influence-Impact Grids</a:t>
-            </a:r>
-            <a:endParaRPr lang="en-US" sz="800" dirty="0">
-              <a:latin typeface="Arial" charset="0"/>
-              <a:ea typeface="Arial" charset="0"/>
-              <a:cs typeface="Arial" charset="0"/>
-            </a:endParaRPr>
+              <a:rPr lang="en-US" sz="800" b="1" dirty="0">
+                <a:latin typeface="Arial" charset="0"/>
+                <a:ea typeface="Arial" charset="0"/>
+                <a:cs typeface="Arial" charset="0"/>
+              </a:rPr>
+              <a:t>Stakeholder classification:</a:t>
+            </a:r>
+            <a:r>
+              <a:rPr lang="en-US" sz="800" dirty="0">
+                <a:latin typeface="Arial" charset="0"/>
+                <a:ea typeface="Arial" charset="0"/>
+                <a:cs typeface="Arial" charset="0"/>
+              </a:rPr>
+              <a:t> Power-Interest/Influence, Influence-Impact Grids</a:t>
+            </a:r>
           </a:p>
           <a:p>
             <a:r>
@@ -5917,131 +5953,26 @@
                 <a:ea typeface="Arial" charset="0"/>
                 <a:cs typeface="Arial" charset="0"/>
               </a:rPr>
-              <a:t>power, urgency, </a:t>
-            </a:r>
-            <a:r>
-              <a:rPr lang="en-US" sz="800" dirty="0" smtClean="0">
-                <a:latin typeface="Arial" charset="0"/>
-                <a:ea typeface="Arial" charset="0"/>
-                <a:cs typeface="Arial" charset="0"/>
-              </a:rPr>
-              <a:t>legitimacy</a:t>
-            </a:r>
-          </a:p>
-          <a:p>
-            <a:r>
-              <a:rPr lang="en-US" sz="800" dirty="0" smtClean="0">
-                <a:latin typeface="Arial" charset="0"/>
-                <a:ea typeface="Arial" charset="0"/>
-                <a:cs typeface="Arial" charset="0"/>
-              </a:rPr>
-              <a:t>Unaware, Resistant, Neutral, Supportive, Leading</a:t>
-            </a:r>
-            <a:endParaRPr lang="en-US" sz="800" dirty="0">
-              <a:latin typeface="Arial" charset="0"/>
-              <a:ea typeface="Arial" charset="0"/>
-              <a:cs typeface="Arial" charset="0"/>
-            </a:endParaRPr>
-          </a:p>
-        </p:txBody>
-      </p:sp>
-      <p:sp>
-        <p:nvSpPr>
-          <p:cNvPr id="13" name="Rectangle 15"/>
-          <p:cNvSpPr/>
-          <p:nvPr/>
-        </p:nvSpPr>
-        <p:spPr>
-          <a:xfrm>
-            <a:off x="5066675" y="7708357"/>
-            <a:ext cx="1615088" cy="369332"/>
-          </a:xfrm>
-          <a:prstGeom prst="rect">
-            <a:avLst/>
-          </a:prstGeom>
-          <a:ln>
-            <a:solidFill>
-              <a:schemeClr val="tx1"/>
-            </a:solidFill>
-          </a:ln>
-        </p:spPr>
-        <p:txBody>
-          <a:bodyPr wrap="square">
-            <a:spAutoFit/>
-          </a:bodyPr>
-          <a:lstStyle/>
-          <a:p>
-            <a:r>
-              <a:rPr lang="en-US" sz="900" dirty="0" smtClean="0"/>
-              <a:t>𝜎</a:t>
-            </a:r>
-            <a:r>
-              <a:rPr lang="en-US" sz="900" baseline="-25000" dirty="0" smtClean="0"/>
-              <a:t>𝛴</a:t>
-            </a:r>
-            <a:r>
-              <a:rPr lang="en-US" sz="900" dirty="0" smtClean="0"/>
-              <a:t> </a:t>
-            </a:r>
-            <a:r>
-              <a:rPr lang="en-US" sz="900" dirty="0"/>
-              <a:t>= </a:t>
-            </a:r>
-            <a:r>
-              <a:rPr lang="en-US" sz="900" dirty="0" smtClean="0"/>
-              <a:t>√𝛴𝜎</a:t>
-            </a:r>
-            <a:r>
-              <a:rPr lang="en-US" sz="900" baseline="30000" dirty="0" smtClean="0"/>
-              <a:t>2</a:t>
-            </a:r>
-          </a:p>
-          <a:p>
-            <a:r>
-              <a:rPr lang="en-US" sz="900" dirty="0" smtClean="0"/>
-              <a:t>PTA = ($</a:t>
-            </a:r>
-            <a:r>
-              <a:rPr lang="en-US" sz="900" baseline="-25000" dirty="0" smtClean="0"/>
-              <a:t>ceil</a:t>
-            </a:r>
-            <a:r>
-              <a:rPr lang="en-US" sz="900" dirty="0" smtClean="0"/>
-              <a:t>-$</a:t>
-            </a:r>
-            <a:r>
-              <a:rPr lang="en-US" sz="900" baseline="-25000" dirty="0" smtClean="0"/>
-              <a:t>tar</a:t>
-            </a:r>
-            <a:r>
-              <a:rPr lang="en-US" sz="900" dirty="0"/>
-              <a:t>-</a:t>
-            </a:r>
-            <a:r>
-              <a:rPr lang="en-US" sz="900" dirty="0" smtClean="0"/>
-              <a:t>$</a:t>
-            </a:r>
-            <a:r>
-              <a:rPr lang="en-US" sz="900" baseline="-25000" dirty="0" smtClean="0"/>
-              <a:t>fee</a:t>
-            </a:r>
-            <a:r>
-              <a:rPr lang="en-US" sz="900" dirty="0" smtClean="0"/>
-              <a:t>)/%</a:t>
-            </a:r>
-            <a:r>
-              <a:rPr lang="en-US" sz="900" baseline="-25000" dirty="0" smtClean="0"/>
-              <a:t>buyer</a:t>
-            </a:r>
-            <a:r>
-              <a:rPr lang="en-US" sz="900" dirty="0" smtClean="0"/>
-              <a:t>+$</a:t>
-            </a:r>
-            <a:r>
-              <a:rPr lang="en-US" sz="900" baseline="-25000" dirty="0" smtClean="0"/>
-              <a:t>tar</a:t>
-            </a:r>
-            <a:endParaRPr lang="en-US" sz="900" baseline="-25000" dirty="0"/>
+              <a:t>power, urgency, legitimacy</a:t>
+            </a:r>
+          </a:p>
+          <a:p>
+            <a:r>
+              <a:rPr lang="en-US" sz="800" b="1" dirty="0">
+                <a:latin typeface="Arial" charset="0"/>
+                <a:ea typeface="Arial" charset="0"/>
+                <a:cs typeface="Arial" charset="0"/>
+              </a:rPr>
+              <a:t>Stakeholders engagement:</a:t>
+            </a:r>
+            <a:r>
+              <a:rPr lang="en-US" sz="800" dirty="0">
+                <a:latin typeface="Arial" charset="0"/>
+                <a:ea typeface="Arial" charset="0"/>
+                <a:cs typeface="Arial" charset="0"/>
+              </a:rPr>
+              <a:t> Unaware, Resistant, Neutral, Supportive, Leading</a:t>
+            </a:r>
           </a:p>
         </p:txBody>
       </p:sp>

</xml_diff>